<commit_message>
Fixed bug in Dependency Injection, misc changes in Web App
</commit_message>
<xml_diff>
--- a/Simple User and Account Management System.pptx
+++ b/Simple User and Account Management System.pptx
@@ -10,6 +10,18 @@
     <p:sldId id="258" r:id="rId4"/>
     <p:sldId id="259" r:id="rId5"/>
     <p:sldId id="260" r:id="rId6"/>
+    <p:sldId id="261" r:id="rId7"/>
+    <p:sldId id="269" r:id="rId8"/>
+    <p:sldId id="262" r:id="rId9"/>
+    <p:sldId id="263" r:id="rId10"/>
+    <p:sldId id="264" r:id="rId11"/>
+    <p:sldId id="265" r:id="rId12"/>
+    <p:sldId id="268" r:id="rId13"/>
+    <p:sldId id="270" r:id="rId14"/>
+    <p:sldId id="271" r:id="rId15"/>
+    <p:sldId id="272" r:id="rId16"/>
+    <p:sldId id="266" r:id="rId17"/>
+    <p:sldId id="267" r:id="rId18"/>
   </p:sldIdLst>
   <p:sldSz cx="12192000" cy="6858000"/>
   <p:notesSz cx="6858000" cy="9144000"/>
@@ -108,6 +120,11 @@
       </a:defRPr>
     </a:lvl9pPr>
   </p:defaultTextStyle>
+  <p:extLst>
+    <p:ext uri="{EFAFB233-063F-42B5-8137-9DF3F51BA10A}">
+      <p15:sldGuideLst xmlns:p15="http://schemas.microsoft.com/office/powerpoint/2012/main"/>
+    </p:ext>
+  </p:extLst>
 </p:presentation>
 </file>
 
@@ -320,7 +337,7 @@
           <a:p>
             <a:fld id="{167FF2CA-5E43-4C10-87F7-E2F57876E683}" type="datetimeFigureOut">
               <a:rPr lang="en-IN" smtClean="0"/>
-              <a:t>27-10-2025</a:t>
+              <a:t>29-10-2025</a:t>
             </a:fld>
             <a:endParaRPr lang="en-IN"/>
           </a:p>
@@ -520,7 +537,7 @@
           <a:p>
             <a:fld id="{167FF2CA-5E43-4C10-87F7-E2F57876E683}" type="datetimeFigureOut">
               <a:rPr lang="en-IN" smtClean="0"/>
-              <a:t>27-10-2025</a:t>
+              <a:t>29-10-2025</a:t>
             </a:fld>
             <a:endParaRPr lang="en-IN"/>
           </a:p>
@@ -730,7 +747,7 @@
           <a:p>
             <a:fld id="{167FF2CA-5E43-4C10-87F7-E2F57876E683}" type="datetimeFigureOut">
               <a:rPr lang="en-IN" smtClean="0"/>
-              <a:t>27-10-2025</a:t>
+              <a:t>29-10-2025</a:t>
             </a:fld>
             <a:endParaRPr lang="en-IN"/>
           </a:p>
@@ -930,7 +947,7 @@
           <a:p>
             <a:fld id="{167FF2CA-5E43-4C10-87F7-E2F57876E683}" type="datetimeFigureOut">
               <a:rPr lang="en-IN" smtClean="0"/>
-              <a:t>27-10-2025</a:t>
+              <a:t>29-10-2025</a:t>
             </a:fld>
             <a:endParaRPr lang="en-IN"/>
           </a:p>
@@ -1206,7 +1223,7 @@
           <a:p>
             <a:fld id="{167FF2CA-5E43-4C10-87F7-E2F57876E683}" type="datetimeFigureOut">
               <a:rPr lang="en-IN" smtClean="0"/>
-              <a:t>27-10-2025</a:t>
+              <a:t>29-10-2025</a:t>
             </a:fld>
             <a:endParaRPr lang="en-IN"/>
           </a:p>
@@ -1474,7 +1491,7 @@
           <a:p>
             <a:fld id="{167FF2CA-5E43-4C10-87F7-E2F57876E683}" type="datetimeFigureOut">
               <a:rPr lang="en-IN" smtClean="0"/>
-              <a:t>27-10-2025</a:t>
+              <a:t>29-10-2025</a:t>
             </a:fld>
             <a:endParaRPr lang="en-IN"/>
           </a:p>
@@ -1889,7 +1906,7 @@
           <a:p>
             <a:fld id="{167FF2CA-5E43-4C10-87F7-E2F57876E683}" type="datetimeFigureOut">
               <a:rPr lang="en-IN" smtClean="0"/>
-              <a:t>27-10-2025</a:t>
+              <a:t>29-10-2025</a:t>
             </a:fld>
             <a:endParaRPr lang="en-IN"/>
           </a:p>
@@ -2031,7 +2048,7 @@
           <a:p>
             <a:fld id="{167FF2CA-5E43-4C10-87F7-E2F57876E683}" type="datetimeFigureOut">
               <a:rPr lang="en-IN" smtClean="0"/>
-              <a:t>27-10-2025</a:t>
+              <a:t>29-10-2025</a:t>
             </a:fld>
             <a:endParaRPr lang="en-IN"/>
           </a:p>
@@ -2144,7 +2161,7 @@
           <a:p>
             <a:fld id="{167FF2CA-5E43-4C10-87F7-E2F57876E683}" type="datetimeFigureOut">
               <a:rPr lang="en-IN" smtClean="0"/>
-              <a:t>27-10-2025</a:t>
+              <a:t>29-10-2025</a:t>
             </a:fld>
             <a:endParaRPr lang="en-IN"/>
           </a:p>
@@ -2457,7 +2474,7 @@
           <a:p>
             <a:fld id="{167FF2CA-5E43-4C10-87F7-E2F57876E683}" type="datetimeFigureOut">
               <a:rPr lang="en-IN" smtClean="0"/>
-              <a:t>27-10-2025</a:t>
+              <a:t>29-10-2025</a:t>
             </a:fld>
             <a:endParaRPr lang="en-IN"/>
           </a:p>
@@ -2746,7 +2763,7 @@
           <a:p>
             <a:fld id="{167FF2CA-5E43-4C10-87F7-E2F57876E683}" type="datetimeFigureOut">
               <a:rPr lang="en-IN" smtClean="0"/>
-              <a:t>27-10-2025</a:t>
+              <a:t>29-10-2025</a:t>
             </a:fld>
             <a:endParaRPr lang="en-IN"/>
           </a:p>
@@ -2989,7 +3006,7 @@
           <a:p>
             <a:fld id="{167FF2CA-5E43-4C10-87F7-E2F57876E683}" type="datetimeFigureOut">
               <a:rPr lang="en-IN" smtClean="0"/>
-              <a:t>27-10-2025</a:t>
+              <a:t>29-10-2025</a:t>
             </a:fld>
             <a:endParaRPr lang="en-IN"/>
           </a:p>
@@ -3543,6 +3560,2279 @@
 </p:sld>
 </file>
 
+<file path=ppt/slides/slide10.xml><?xml version="1.0" encoding="utf-8"?>
+<p:sld xmlns:a="http://schemas.openxmlformats.org/drawingml/2006/main" xmlns:r="http://schemas.openxmlformats.org/officeDocument/2006/relationships" xmlns:p="http://schemas.openxmlformats.org/presentationml/2006/main">
+  <p:cSld>
+    <p:spTree>
+      <p:nvGrpSpPr>
+        <p:cNvPr id="1" name=""/>
+        <p:cNvGrpSpPr/>
+        <p:nvPr/>
+      </p:nvGrpSpPr>
+      <p:grpSpPr>
+        <a:xfrm>
+          <a:off x="0" y="0"/>
+          <a:ext cx="0" cy="0"/>
+          <a:chOff x="0" y="0"/>
+          <a:chExt cx="0" cy="0"/>
+        </a:xfrm>
+      </p:grpSpPr>
+      <p:sp>
+        <p:nvSpPr>
+          <p:cNvPr id="2" name="Title 1">
+            <a:extLst>
+              <a:ext uri="{FF2B5EF4-FFF2-40B4-BE49-F238E27FC236}">
+                <a16:creationId xmlns:a16="http://schemas.microsoft.com/office/drawing/2014/main" id="{43EFBC5A-F8AA-A176-343C-59108B686A2E}"/>
+              </a:ext>
+            </a:extLst>
+          </p:cNvPr>
+          <p:cNvSpPr>
+            <a:spLocks noGrp="1"/>
+          </p:cNvSpPr>
+          <p:nvPr>
+            <p:ph type="title"/>
+          </p:nvPr>
+        </p:nvSpPr>
+        <p:spPr/>
+        <p:txBody>
+          <a:bodyPr/>
+          <a:lstStyle/>
+          <a:p>
+            <a:r>
+              <a:rPr lang="en-US" dirty="0"/>
+              <a:t>Entity Design</a:t>
+            </a:r>
+            <a:endParaRPr lang="en-IN" dirty="0"/>
+          </a:p>
+        </p:txBody>
+      </p:sp>
+      <p:sp>
+        <p:nvSpPr>
+          <p:cNvPr id="3" name="Content Placeholder 2">
+            <a:extLst>
+              <a:ext uri="{FF2B5EF4-FFF2-40B4-BE49-F238E27FC236}">
+                <a16:creationId xmlns:a16="http://schemas.microsoft.com/office/drawing/2014/main" id="{B7DA9105-A01F-F218-8A37-D44557B76143}"/>
+              </a:ext>
+            </a:extLst>
+          </p:cNvPr>
+          <p:cNvSpPr>
+            <a:spLocks noGrp="1"/>
+          </p:cNvSpPr>
+          <p:nvPr>
+            <p:ph idx="1"/>
+          </p:nvPr>
+        </p:nvSpPr>
+        <p:spPr/>
+        <p:txBody>
+          <a:bodyPr/>
+          <a:lstStyle/>
+          <a:p>
+            <a:r>
+              <a:rPr lang="en-US" dirty="0"/>
+              <a:t>Common Entities</a:t>
+            </a:r>
+          </a:p>
+          <a:p>
+            <a:pPr lvl="1"/>
+            <a:r>
+              <a:rPr lang="en-US" dirty="0"/>
+              <a:t>Roles</a:t>
+            </a:r>
+          </a:p>
+          <a:p>
+            <a:pPr lvl="1"/>
+            <a:r>
+              <a:rPr lang="en-US" dirty="0"/>
+              <a:t>Permissions</a:t>
+            </a:r>
+          </a:p>
+          <a:p>
+            <a:r>
+              <a:rPr lang="en-US" dirty="0"/>
+              <a:t>Per Domain Entity </a:t>
+            </a:r>
+          </a:p>
+          <a:p>
+            <a:pPr lvl="1"/>
+            <a:r>
+              <a:rPr lang="en-US" dirty="0"/>
+              <a:t>Banks</a:t>
+            </a:r>
+          </a:p>
+          <a:p>
+            <a:pPr lvl="1"/>
+            <a:r>
+              <a:rPr lang="en-US" dirty="0"/>
+              <a:t>Accounts</a:t>
+            </a:r>
+          </a:p>
+          <a:p>
+            <a:pPr lvl="1"/>
+            <a:r>
+              <a:rPr lang="en-US" dirty="0"/>
+              <a:t>Users</a:t>
+            </a:r>
+          </a:p>
+          <a:p>
+            <a:pPr lvl="1"/>
+            <a:r>
+              <a:rPr lang="en-US" dirty="0"/>
+              <a:t>Employees </a:t>
+            </a:r>
+            <a:endParaRPr lang="en-IN" dirty="0"/>
+          </a:p>
+        </p:txBody>
+      </p:sp>
+      <p:sp>
+        <p:nvSpPr>
+          <p:cNvPr id="4" name="Right Brace 3">
+            <a:extLst>
+              <a:ext uri="{FF2B5EF4-FFF2-40B4-BE49-F238E27FC236}">
+                <a16:creationId xmlns:a16="http://schemas.microsoft.com/office/drawing/2014/main" id="{14290348-B1D4-14DF-BFA1-3B1A28C4CFF9}"/>
+              </a:ext>
+            </a:extLst>
+          </p:cNvPr>
+          <p:cNvSpPr/>
+          <p:nvPr/>
+        </p:nvSpPr>
+        <p:spPr>
+          <a:xfrm>
+            <a:off x="6096000" y="3637722"/>
+            <a:ext cx="921026" cy="1560443"/>
+          </a:xfrm>
+          <a:prstGeom prst="rightBrace">
+            <a:avLst/>
+          </a:prstGeom>
+        </p:spPr>
+        <p:style>
+          <a:lnRef idx="1">
+            <a:schemeClr val="accent1"/>
+          </a:lnRef>
+          <a:fillRef idx="0">
+            <a:schemeClr val="accent1"/>
+          </a:fillRef>
+          <a:effectRef idx="0">
+            <a:schemeClr val="accent1"/>
+          </a:effectRef>
+          <a:fontRef idx="minor">
+            <a:schemeClr val="tx1"/>
+          </a:fontRef>
+        </p:style>
+        <p:txBody>
+          <a:bodyPr rtlCol="0" anchor="ctr"/>
+          <a:lstStyle/>
+          <a:p>
+            <a:pPr algn="ctr"/>
+            <a:endParaRPr lang="en-IN"/>
+          </a:p>
+        </p:txBody>
+      </p:sp>
+      <p:sp>
+        <p:nvSpPr>
+          <p:cNvPr id="5" name="TextBox 4">
+            <a:extLst>
+              <a:ext uri="{FF2B5EF4-FFF2-40B4-BE49-F238E27FC236}">
+                <a16:creationId xmlns:a16="http://schemas.microsoft.com/office/drawing/2014/main" id="{3351EEE3-1BD1-46EE-A5AB-06A7E44A2BBE}"/>
+              </a:ext>
+            </a:extLst>
+          </p:cNvPr>
+          <p:cNvSpPr txBox="1"/>
+          <p:nvPr/>
+        </p:nvSpPr>
+        <p:spPr>
+          <a:xfrm>
+            <a:off x="7308574" y="4053220"/>
+            <a:ext cx="4412974" cy="830997"/>
+          </a:xfrm>
+          <a:prstGeom prst="rect">
+            <a:avLst/>
+          </a:prstGeom>
+          <a:noFill/>
+        </p:spPr>
+        <p:txBody>
+          <a:bodyPr wrap="square" rtlCol="0">
+            <a:spAutoFit/>
+          </a:bodyPr>
+          <a:lstStyle/>
+          <a:p>
+            <a:r>
+              <a:rPr lang="en-US" sz="2400" dirty="0"/>
+              <a:t>They are used across domain, but belong to exactly one domain </a:t>
+            </a:r>
+            <a:r>
+              <a:rPr lang="en-US" sz="2400" dirty="0">
+                <a:sym typeface="Wingdings" panose="05000000000000000000" pitchFamily="2" charset="2"/>
+              </a:rPr>
+              <a:t> </a:t>
+            </a:r>
+            <a:endParaRPr lang="en-IN" sz="2400" dirty="0"/>
+          </a:p>
+        </p:txBody>
+      </p:sp>
+    </p:spTree>
+    <p:extLst>
+      <p:ext uri="{BB962C8B-B14F-4D97-AF65-F5344CB8AC3E}">
+        <p14:creationId xmlns:p14="http://schemas.microsoft.com/office/powerpoint/2010/main" val="3343024781"/>
+      </p:ext>
+    </p:extLst>
+  </p:cSld>
+  <p:clrMapOvr>
+    <a:masterClrMapping/>
+  </p:clrMapOvr>
+</p:sld>
+</file>
+
+<file path=ppt/slides/slide11.xml><?xml version="1.0" encoding="utf-8"?>
+<p:sld xmlns:a="http://schemas.openxmlformats.org/drawingml/2006/main" xmlns:r="http://schemas.openxmlformats.org/officeDocument/2006/relationships" xmlns:p="http://schemas.openxmlformats.org/presentationml/2006/main">
+  <p:cSld>
+    <p:spTree>
+      <p:nvGrpSpPr>
+        <p:cNvPr id="1" name=""/>
+        <p:cNvGrpSpPr/>
+        <p:nvPr/>
+      </p:nvGrpSpPr>
+      <p:grpSpPr>
+        <a:xfrm>
+          <a:off x="0" y="0"/>
+          <a:ext cx="0" cy="0"/>
+          <a:chOff x="0" y="0"/>
+          <a:chExt cx="0" cy="0"/>
+        </a:xfrm>
+      </p:grpSpPr>
+      <p:sp>
+        <p:nvSpPr>
+          <p:cNvPr id="2" name="Title 1">
+            <a:extLst>
+              <a:ext uri="{FF2B5EF4-FFF2-40B4-BE49-F238E27FC236}">
+                <a16:creationId xmlns:a16="http://schemas.microsoft.com/office/drawing/2014/main" id="{50E6A1FD-4EAB-937E-A268-44A3A9B31D6A}"/>
+              </a:ext>
+            </a:extLst>
+          </p:cNvPr>
+          <p:cNvSpPr>
+            <a:spLocks noGrp="1"/>
+          </p:cNvSpPr>
+          <p:nvPr>
+            <p:ph type="title"/>
+          </p:nvPr>
+        </p:nvSpPr>
+        <p:spPr/>
+        <p:txBody>
+          <a:bodyPr/>
+          <a:lstStyle/>
+          <a:p>
+            <a:r>
+              <a:rPr lang="en-US" dirty="0"/>
+              <a:t>Getting Started</a:t>
+            </a:r>
+            <a:endParaRPr lang="en-IN" dirty="0"/>
+          </a:p>
+        </p:txBody>
+      </p:sp>
+      <p:sp>
+        <p:nvSpPr>
+          <p:cNvPr id="3" name="Content Placeholder 2">
+            <a:extLst>
+              <a:ext uri="{FF2B5EF4-FFF2-40B4-BE49-F238E27FC236}">
+                <a16:creationId xmlns:a16="http://schemas.microsoft.com/office/drawing/2014/main" id="{B4BAD17D-F7C2-3051-ECE6-5D5E0D0B2BD9}"/>
+              </a:ext>
+            </a:extLst>
+          </p:cNvPr>
+          <p:cNvSpPr>
+            <a:spLocks noGrp="1"/>
+          </p:cNvSpPr>
+          <p:nvPr>
+            <p:ph idx="1"/>
+          </p:nvPr>
+        </p:nvSpPr>
+        <p:spPr/>
+        <p:txBody>
+          <a:bodyPr>
+            <a:normAutofit fontScale="92500" lnSpcReduction="10000"/>
+          </a:bodyPr>
+          <a:lstStyle/>
+          <a:p>
+            <a:r>
+              <a:rPr lang="en-US" dirty="0"/>
+              <a:t>Your “SPRINT BACKLOG #0”		EXPECTED 2:00 PM</a:t>
+            </a:r>
+          </a:p>
+          <a:p>
+            <a:pPr lvl="1"/>
+            <a:endParaRPr lang="en-IN" dirty="0"/>
+          </a:p>
+          <a:p>
+            <a:pPr lvl="1"/>
+            <a:r>
+              <a:rPr lang="en-IN" dirty="0">
+                <a:hlinkClick r:id="rId2"/>
+              </a:rPr>
+              <a:t>https://github.com/&lt;yourid&gt;/submission</a:t>
+            </a:r>
+            <a:r>
+              <a:rPr lang="en-IN" dirty="0"/>
+              <a:t> </a:t>
+            </a:r>
+          </a:p>
+          <a:p>
+            <a:pPr lvl="1"/>
+            <a:endParaRPr lang="en-IN" dirty="0"/>
+          </a:p>
+          <a:p>
+            <a:pPr lvl="1"/>
+            <a:r>
+              <a:rPr lang="en-IN" dirty="0"/>
+              <a:t>Write Problem statement with all requirements (implicit and explicit) in statement.txt </a:t>
+            </a:r>
+          </a:p>
+          <a:p>
+            <a:pPr lvl="1"/>
+            <a:endParaRPr lang="en-IN" dirty="0"/>
+          </a:p>
+          <a:p>
+            <a:pPr lvl="1"/>
+            <a:r>
+              <a:rPr lang="en-IN" dirty="0"/>
+              <a:t>Write all assumptions in assumptions.txt</a:t>
+            </a:r>
+          </a:p>
+          <a:p>
+            <a:pPr lvl="1"/>
+            <a:endParaRPr lang="en-IN" dirty="0"/>
+          </a:p>
+          <a:p>
+            <a:pPr lvl="1"/>
+            <a:r>
+              <a:rPr lang="en-IN" dirty="0"/>
+              <a:t>Write all entities and attributes in </a:t>
+            </a:r>
+            <a:r>
+              <a:rPr lang="en-IN" dirty="0" err="1"/>
+              <a:t>DDL.sql</a:t>
+            </a:r>
+            <a:r>
+              <a:rPr lang="en-IN" dirty="0"/>
+              <a:t>  (THIS IS A SQL File and should be executable inside SQL Server)</a:t>
+            </a:r>
+          </a:p>
+          <a:p>
+            <a:pPr lvl="2"/>
+            <a:r>
+              <a:rPr lang="en-IN" dirty="0"/>
+              <a:t>Excel will also work </a:t>
+            </a:r>
+            <a:r>
+              <a:rPr lang="en-IN" dirty="0">
+                <a:sym typeface="Wingdings" panose="05000000000000000000" pitchFamily="2" charset="2"/>
+              </a:rPr>
+              <a:t> </a:t>
+            </a:r>
+          </a:p>
+          <a:p>
+            <a:pPr lvl="3"/>
+            <a:r>
+              <a:rPr lang="en-IN" dirty="0">
+                <a:sym typeface="Wingdings" panose="05000000000000000000" pitchFamily="2" charset="2"/>
+              </a:rPr>
+              <a:t>Name, Length, Not Null, Key, Constraint, </a:t>
+            </a:r>
+            <a:r>
+              <a:rPr lang="en-IN" dirty="0" err="1">
+                <a:sym typeface="Wingdings" panose="05000000000000000000" pitchFamily="2" charset="2"/>
+              </a:rPr>
+              <a:t>UniqueNess</a:t>
+            </a:r>
+            <a:endParaRPr lang="en-IN" dirty="0"/>
+          </a:p>
+          <a:p>
+            <a:pPr lvl="1"/>
+            <a:endParaRPr lang="en-IN" dirty="0"/>
+          </a:p>
+          <a:p>
+            <a:pPr lvl="1"/>
+            <a:endParaRPr lang="en-IN" dirty="0"/>
+          </a:p>
+        </p:txBody>
+      </p:sp>
+    </p:spTree>
+    <p:extLst>
+      <p:ext uri="{BB962C8B-B14F-4D97-AF65-F5344CB8AC3E}">
+        <p14:creationId xmlns:p14="http://schemas.microsoft.com/office/powerpoint/2010/main" val="3528282882"/>
+      </p:ext>
+    </p:extLst>
+  </p:cSld>
+  <p:clrMapOvr>
+    <a:masterClrMapping/>
+  </p:clrMapOvr>
+</p:sld>
+</file>
+
+<file path=ppt/slides/slide12.xml><?xml version="1.0" encoding="utf-8"?>
+<p:sld xmlns:a="http://schemas.openxmlformats.org/drawingml/2006/main" xmlns:r="http://schemas.openxmlformats.org/officeDocument/2006/relationships" xmlns:p="http://schemas.openxmlformats.org/presentationml/2006/main">
+  <p:cSld>
+    <p:spTree>
+      <p:nvGrpSpPr>
+        <p:cNvPr id="1" name="">
+          <a:extLst>
+            <a:ext uri="{FF2B5EF4-FFF2-40B4-BE49-F238E27FC236}">
+              <a16:creationId xmlns:a16="http://schemas.microsoft.com/office/drawing/2014/main" id="{CBFBB7E7-E55E-EC79-2873-2D4FFF74E4ED}"/>
+            </a:ext>
+          </a:extLst>
+        </p:cNvPr>
+        <p:cNvGrpSpPr/>
+        <p:nvPr/>
+      </p:nvGrpSpPr>
+      <p:grpSpPr>
+        <a:xfrm>
+          <a:off x="0" y="0"/>
+          <a:ext cx="0" cy="0"/>
+          <a:chOff x="0" y="0"/>
+          <a:chExt cx="0" cy="0"/>
+        </a:xfrm>
+      </p:grpSpPr>
+      <p:sp>
+        <p:nvSpPr>
+          <p:cNvPr id="2" name="Title 1">
+            <a:extLst>
+              <a:ext uri="{FF2B5EF4-FFF2-40B4-BE49-F238E27FC236}">
+                <a16:creationId xmlns:a16="http://schemas.microsoft.com/office/drawing/2014/main" id="{759D4F6A-CA33-4C88-C666-939C0B17CDE1}"/>
+              </a:ext>
+            </a:extLst>
+          </p:cNvPr>
+          <p:cNvSpPr>
+            <a:spLocks noGrp="1"/>
+          </p:cNvSpPr>
+          <p:nvPr>
+            <p:ph type="title"/>
+          </p:nvPr>
+        </p:nvSpPr>
+        <p:spPr/>
+        <p:txBody>
+          <a:bodyPr/>
+          <a:lstStyle/>
+          <a:p>
+            <a:r>
+              <a:rPr lang="en-US" dirty="0"/>
+              <a:t>Getting Started</a:t>
+            </a:r>
+            <a:endParaRPr lang="en-IN" dirty="0"/>
+          </a:p>
+        </p:txBody>
+      </p:sp>
+      <p:sp>
+        <p:nvSpPr>
+          <p:cNvPr id="3" name="Content Placeholder 2">
+            <a:extLst>
+              <a:ext uri="{FF2B5EF4-FFF2-40B4-BE49-F238E27FC236}">
+                <a16:creationId xmlns:a16="http://schemas.microsoft.com/office/drawing/2014/main" id="{1AEED06E-3E24-EF8E-FCD1-091426F5E4B2}"/>
+              </a:ext>
+            </a:extLst>
+          </p:cNvPr>
+          <p:cNvSpPr>
+            <a:spLocks noGrp="1"/>
+          </p:cNvSpPr>
+          <p:nvPr>
+            <p:ph idx="1"/>
+          </p:nvPr>
+        </p:nvSpPr>
+        <p:spPr/>
+        <p:txBody>
+          <a:bodyPr>
+            <a:normAutofit fontScale="85000" lnSpcReduction="20000"/>
+          </a:bodyPr>
+          <a:lstStyle/>
+          <a:p>
+            <a:r>
+              <a:rPr lang="en-US" dirty="0"/>
+              <a:t>Your “SPRINT BACKLOG #1”                      EXPECTED 6:00 PM </a:t>
+            </a:r>
+            <a:r>
+              <a:rPr lang="en-US" b="1" dirty="0">
+                <a:solidFill>
+                  <a:srgbClr val="C00000"/>
+                </a:solidFill>
+              </a:rPr>
+              <a:t>Oct 29 2025 12 PM</a:t>
+            </a:r>
+            <a:endParaRPr lang="en-IN" b="1" dirty="0">
+              <a:solidFill>
+                <a:srgbClr val="C00000"/>
+              </a:solidFill>
+            </a:endParaRPr>
+          </a:p>
+          <a:p>
+            <a:pPr lvl="1"/>
+            <a:r>
+              <a:rPr lang="en-IN" b="1" dirty="0">
+                <a:highlight>
+                  <a:srgbClr val="FFFF00"/>
+                </a:highlight>
+              </a:rPr>
+              <a:t>Bank Customers Entities</a:t>
+            </a:r>
+          </a:p>
+          <a:p>
+            <a:pPr lvl="1"/>
+            <a:r>
+              <a:rPr lang="en-IN" b="1" dirty="0"/>
+              <a:t>Roles and Permissions Entities</a:t>
+            </a:r>
+          </a:p>
+          <a:p>
+            <a:pPr lvl="1"/>
+            <a:r>
+              <a:rPr lang="en-IN" b="1" dirty="0" err="1"/>
+              <a:t>JWTService</a:t>
+            </a:r>
+            <a:endParaRPr lang="en-IN" b="1" dirty="0"/>
+          </a:p>
+          <a:p>
+            <a:pPr lvl="1"/>
+            <a:r>
+              <a:rPr lang="en-IN" b="1" dirty="0"/>
+              <a:t>/login API </a:t>
+            </a:r>
+          </a:p>
+          <a:p>
+            <a:pPr lvl="1"/>
+            <a:r>
+              <a:rPr lang="en-IN" dirty="0">
+                <a:solidFill>
+                  <a:srgbClr val="C00000"/>
+                </a:solidFill>
+              </a:rPr>
+              <a:t>Authorization</a:t>
+            </a:r>
+          </a:p>
+          <a:p>
+            <a:pPr lvl="1"/>
+            <a:r>
+              <a:rPr lang="en-IN" dirty="0">
+                <a:solidFill>
+                  <a:srgbClr val="C00000"/>
+                </a:solidFill>
+              </a:rPr>
+              <a:t>CRUD operations</a:t>
+            </a:r>
+          </a:p>
+          <a:p>
+            <a:pPr lvl="2"/>
+            <a:r>
+              <a:rPr lang="en-IN" dirty="0">
+                <a:solidFill>
+                  <a:srgbClr val="C00000"/>
+                </a:solidFill>
+              </a:rPr>
+              <a:t>Create Users</a:t>
+            </a:r>
+          </a:p>
+          <a:p>
+            <a:pPr lvl="2"/>
+            <a:r>
+              <a:rPr lang="en-IN" dirty="0">
+                <a:solidFill>
+                  <a:srgbClr val="C00000"/>
+                </a:solidFill>
+              </a:rPr>
+              <a:t>……..</a:t>
+            </a:r>
+          </a:p>
+          <a:p>
+            <a:pPr lvl="2"/>
+            <a:endParaRPr lang="en-IN" dirty="0"/>
+          </a:p>
+          <a:p>
+            <a:pPr lvl="1"/>
+            <a:r>
+              <a:rPr lang="en-IN" dirty="0"/>
+              <a:t>EXPECTED: 	</a:t>
+            </a:r>
+            <a:r>
+              <a:rPr lang="en-IN" dirty="0">
+                <a:solidFill>
+                  <a:srgbClr val="00B050"/>
+                </a:solidFill>
+              </a:rPr>
+              <a:t>Screenshot evidence_schema.png </a:t>
+            </a:r>
+            <a:r>
+              <a:rPr lang="en-IN" dirty="0">
+                <a:sym typeface="Wingdings" panose="05000000000000000000" pitchFamily="2" charset="2"/>
+              </a:rPr>
+              <a:t> </a:t>
+            </a:r>
+          </a:p>
+          <a:p>
+            <a:pPr lvl="1"/>
+            <a:r>
+              <a:rPr lang="en-IN" dirty="0">
+                <a:sym typeface="Wingdings" panose="05000000000000000000" pitchFamily="2" charset="2"/>
+              </a:rPr>
+              <a:t>                                  /login </a:t>
+            </a:r>
+            <a:r>
+              <a:rPr lang="en-IN" dirty="0" err="1">
+                <a:sym typeface="Wingdings" panose="05000000000000000000" pitchFamily="2" charset="2"/>
+              </a:rPr>
+              <a:t>api</a:t>
+            </a:r>
+            <a:r>
+              <a:rPr lang="en-IN" dirty="0">
+                <a:sym typeface="Wingdings" panose="05000000000000000000" pitchFamily="2" charset="2"/>
+              </a:rPr>
+              <a:t> - &gt; screenshot evidence_login.png –</a:t>
+            </a:r>
+          </a:p>
+          <a:p>
+            <a:pPr lvl="2"/>
+            <a:r>
+              <a:rPr lang="en-IN" dirty="0">
+                <a:sym typeface="Wingdings" panose="05000000000000000000" pitchFamily="2" charset="2"/>
+              </a:rPr>
+              <a:t>                                screenshot  </a:t>
+            </a:r>
+            <a:r>
+              <a:rPr lang="en-IN" dirty="0" err="1">
+                <a:sym typeface="Wingdings" panose="05000000000000000000" pitchFamily="2" charset="2"/>
+              </a:rPr>
+              <a:t>evidence_roles</a:t>
+            </a:r>
+            <a:r>
+              <a:rPr lang="en-IN" dirty="0">
+                <a:sym typeface="Wingdings" panose="05000000000000000000" pitchFamily="2" charset="2"/>
+              </a:rPr>
+              <a:t>[1|2|3|4].</a:t>
+            </a:r>
+            <a:r>
+              <a:rPr lang="en-IN" dirty="0" err="1">
+                <a:sym typeface="Wingdings" panose="05000000000000000000" pitchFamily="2" charset="2"/>
+              </a:rPr>
+              <a:t>png</a:t>
+            </a:r>
+            <a:r>
+              <a:rPr lang="en-IN" dirty="0">
+                <a:sym typeface="Wingdings" panose="05000000000000000000" pitchFamily="2" charset="2"/>
+              </a:rPr>
+              <a:t> -&gt; </a:t>
+            </a:r>
+          </a:p>
+          <a:p>
+            <a:pPr lvl="6"/>
+            <a:r>
+              <a:rPr lang="en-IN" sz="3800" b="1" dirty="0">
+                <a:sym typeface="Wingdings" panose="05000000000000000000" pitchFamily="2" charset="2"/>
+              </a:rPr>
+              <a:t>/submission/</a:t>
+            </a:r>
+            <a:r>
+              <a:rPr lang="en-IN" sz="3800" b="1" dirty="0" err="1">
+                <a:sym typeface="Wingdings" panose="05000000000000000000" pitchFamily="2" charset="2"/>
+              </a:rPr>
+              <a:t>BankCustomerAPI</a:t>
+            </a:r>
+            <a:endParaRPr lang="en-IN" sz="3800" b="1" dirty="0">
+              <a:sym typeface="Wingdings" panose="05000000000000000000" pitchFamily="2" charset="2"/>
+            </a:endParaRPr>
+          </a:p>
+        </p:txBody>
+      </p:sp>
+    </p:spTree>
+    <p:extLst>
+      <p:ext uri="{BB962C8B-B14F-4D97-AF65-F5344CB8AC3E}">
+        <p14:creationId xmlns:p14="http://schemas.microsoft.com/office/powerpoint/2010/main" val="3360004965"/>
+      </p:ext>
+    </p:extLst>
+  </p:cSld>
+  <p:clrMapOvr>
+    <a:masterClrMapping/>
+  </p:clrMapOvr>
+</p:sld>
+</file>
+
+<file path=ppt/slides/slide13.xml><?xml version="1.0" encoding="utf-8"?>
+<p:sld xmlns:a="http://schemas.openxmlformats.org/drawingml/2006/main" xmlns:r="http://schemas.openxmlformats.org/officeDocument/2006/relationships" xmlns:p="http://schemas.openxmlformats.org/presentationml/2006/main">
+  <p:cSld>
+    <p:spTree>
+      <p:nvGrpSpPr>
+        <p:cNvPr id="1" name=""/>
+        <p:cNvGrpSpPr/>
+        <p:nvPr/>
+      </p:nvGrpSpPr>
+      <p:grpSpPr>
+        <a:xfrm>
+          <a:off x="0" y="0"/>
+          <a:ext cx="0" cy="0"/>
+          <a:chOff x="0" y="0"/>
+          <a:chExt cx="0" cy="0"/>
+        </a:xfrm>
+      </p:grpSpPr>
+      <p:graphicFrame>
+        <p:nvGraphicFramePr>
+          <p:cNvPr id="4" name="Table 3">
+            <a:extLst>
+              <a:ext uri="{FF2B5EF4-FFF2-40B4-BE49-F238E27FC236}">
+                <a16:creationId xmlns:a16="http://schemas.microsoft.com/office/drawing/2014/main" id="{8E2D46D2-AFA5-FE2B-C09B-05EB575D3B05}"/>
+              </a:ext>
+            </a:extLst>
+          </p:cNvPr>
+          <p:cNvGraphicFramePr>
+            <a:graphicFrameLocks noGrp="1"/>
+          </p:cNvGraphicFramePr>
+          <p:nvPr>
+            <p:extLst>
+              <p:ext uri="{D42A27DB-BD31-4B8C-83A1-F6EECF244321}">
+                <p14:modId xmlns:p14="http://schemas.microsoft.com/office/powerpoint/2010/main" val="2565154376"/>
+              </p:ext>
+            </p:extLst>
+          </p:nvPr>
+        </p:nvGraphicFramePr>
+        <p:xfrm>
+          <a:off x="2032000" y="719666"/>
+          <a:ext cx="8127999" cy="1112520"/>
+        </p:xfrm>
+        <a:graphic>
+          <a:graphicData uri="http://schemas.openxmlformats.org/drawingml/2006/table">
+            <a:tbl>
+              <a:tblPr firstRow="1" bandRow="1">
+                <a:tableStyleId>{5C22544A-7EE6-4342-B048-85BDC9FD1C3A}</a:tableStyleId>
+              </a:tblPr>
+              <a:tblGrid>
+                <a:gridCol w="2709333">
+                  <a:extLst>
+                    <a:ext uri="{9D8B030D-6E8A-4147-A177-3AD203B41FA5}">
+                      <a16:colId xmlns:a16="http://schemas.microsoft.com/office/drawing/2014/main" val="739322558"/>
+                    </a:ext>
+                  </a:extLst>
+                </a:gridCol>
+                <a:gridCol w="2709333">
+                  <a:extLst>
+                    <a:ext uri="{9D8B030D-6E8A-4147-A177-3AD203B41FA5}">
+                      <a16:colId xmlns:a16="http://schemas.microsoft.com/office/drawing/2014/main" val="3768447142"/>
+                    </a:ext>
+                  </a:extLst>
+                </a:gridCol>
+                <a:gridCol w="2709333">
+                  <a:extLst>
+                    <a:ext uri="{9D8B030D-6E8A-4147-A177-3AD203B41FA5}">
+                      <a16:colId xmlns:a16="http://schemas.microsoft.com/office/drawing/2014/main" val="199933871"/>
+                    </a:ext>
+                  </a:extLst>
+                </a:gridCol>
+              </a:tblGrid>
+              <a:tr h="370840">
+                <a:tc>
+                  <a:txBody>
+                    <a:bodyPr/>
+                    <a:lstStyle/>
+                    <a:p>
+                      <a:r>
+                        <a:rPr lang="en-US" dirty="0"/>
+                        <a:t>TABLE</a:t>
+                      </a:r>
+                      <a:endParaRPr lang="en-IN" dirty="0"/>
+                    </a:p>
+                  </a:txBody>
+                  <a:tcPr/>
+                </a:tc>
+                <a:tc>
+                  <a:txBody>
+                    <a:bodyPr/>
+                    <a:lstStyle/>
+                    <a:p>
+                      <a:r>
+                        <a:rPr lang="en-US" dirty="0"/>
+                        <a:t>USER</a:t>
+                      </a:r>
+                      <a:endParaRPr lang="en-IN" dirty="0"/>
+                    </a:p>
+                  </a:txBody>
+                  <a:tcPr/>
+                </a:tc>
+                <a:tc>
+                  <a:txBody>
+                    <a:bodyPr/>
+                    <a:lstStyle/>
+                    <a:p>
+                      <a:endParaRPr lang="en-IN"/>
+                    </a:p>
+                  </a:txBody>
+                  <a:tcPr/>
+                </a:tc>
+                <a:extLst>
+                  <a:ext uri="{0D108BD9-81ED-4DB2-BD59-A6C34878D82A}">
+                    <a16:rowId xmlns:a16="http://schemas.microsoft.com/office/drawing/2014/main" val="706316532"/>
+                  </a:ext>
+                </a:extLst>
+              </a:tr>
+              <a:tr h="370840">
+                <a:tc>
+                  <a:txBody>
+                    <a:bodyPr/>
+                    <a:lstStyle/>
+                    <a:p>
+                      <a:r>
+                        <a:rPr lang="en-US" dirty="0"/>
+                        <a:t>USERID</a:t>
+                      </a:r>
+                      <a:endParaRPr lang="en-IN" dirty="0"/>
+                    </a:p>
+                  </a:txBody>
+                  <a:tcPr/>
+                </a:tc>
+                <a:tc>
+                  <a:txBody>
+                    <a:bodyPr/>
+                    <a:lstStyle/>
+                    <a:p>
+                      <a:r>
+                        <a:rPr lang="en-US" dirty="0"/>
+                        <a:t>PRIMARY KEY</a:t>
+                      </a:r>
+                      <a:endParaRPr lang="en-IN" dirty="0"/>
+                    </a:p>
+                  </a:txBody>
+                  <a:tcPr/>
+                </a:tc>
+                <a:tc>
+                  <a:txBody>
+                    <a:bodyPr/>
+                    <a:lstStyle/>
+                    <a:p>
+                      <a:endParaRPr lang="en-IN"/>
+                    </a:p>
+                  </a:txBody>
+                  <a:tcPr/>
+                </a:tc>
+                <a:extLst>
+                  <a:ext uri="{0D108BD9-81ED-4DB2-BD59-A6C34878D82A}">
+                    <a16:rowId xmlns:a16="http://schemas.microsoft.com/office/drawing/2014/main" val="301851593"/>
+                  </a:ext>
+                </a:extLst>
+              </a:tr>
+              <a:tr h="370840">
+                <a:tc>
+                  <a:txBody>
+                    <a:bodyPr/>
+                    <a:lstStyle/>
+                    <a:p>
+                      <a:r>
+                        <a:rPr lang="en-US" dirty="0"/>
+                        <a:t>…..</a:t>
+                      </a:r>
+                      <a:endParaRPr lang="en-IN" dirty="0"/>
+                    </a:p>
+                  </a:txBody>
+                  <a:tcPr/>
+                </a:tc>
+                <a:tc>
+                  <a:txBody>
+                    <a:bodyPr/>
+                    <a:lstStyle/>
+                    <a:p>
+                      <a:endParaRPr lang="en-IN"/>
+                    </a:p>
+                  </a:txBody>
+                  <a:tcPr/>
+                </a:tc>
+                <a:tc>
+                  <a:txBody>
+                    <a:bodyPr/>
+                    <a:lstStyle/>
+                    <a:p>
+                      <a:endParaRPr lang="en-IN" dirty="0"/>
+                    </a:p>
+                  </a:txBody>
+                  <a:tcPr/>
+                </a:tc>
+                <a:extLst>
+                  <a:ext uri="{0D108BD9-81ED-4DB2-BD59-A6C34878D82A}">
+                    <a16:rowId xmlns:a16="http://schemas.microsoft.com/office/drawing/2014/main" val="1005661982"/>
+                  </a:ext>
+                </a:extLst>
+              </a:tr>
+            </a:tbl>
+          </a:graphicData>
+        </a:graphic>
+      </p:graphicFrame>
+      <p:graphicFrame>
+        <p:nvGraphicFramePr>
+          <p:cNvPr id="5" name="Table 4">
+            <a:extLst>
+              <a:ext uri="{FF2B5EF4-FFF2-40B4-BE49-F238E27FC236}">
+                <a16:creationId xmlns:a16="http://schemas.microsoft.com/office/drawing/2014/main" id="{F41FB8A0-729A-27F6-86E5-B3F004E2104C}"/>
+              </a:ext>
+            </a:extLst>
+          </p:cNvPr>
+          <p:cNvGraphicFramePr>
+            <a:graphicFrameLocks noGrp="1"/>
+          </p:cNvGraphicFramePr>
+          <p:nvPr>
+            <p:extLst>
+              <p:ext uri="{D42A27DB-BD31-4B8C-83A1-F6EECF244321}">
+                <p14:modId xmlns:p14="http://schemas.microsoft.com/office/powerpoint/2010/main" val="1993661849"/>
+              </p:ext>
+            </p:extLst>
+          </p:nvPr>
+        </p:nvGraphicFramePr>
+        <p:xfrm>
+          <a:off x="2031999" y="2421734"/>
+          <a:ext cx="8127999" cy="1112520"/>
+        </p:xfrm>
+        <a:graphic>
+          <a:graphicData uri="http://schemas.openxmlformats.org/drawingml/2006/table">
+            <a:tbl>
+              <a:tblPr firstRow="1" bandRow="1">
+                <a:tableStyleId>{5C22544A-7EE6-4342-B048-85BDC9FD1C3A}</a:tableStyleId>
+              </a:tblPr>
+              <a:tblGrid>
+                <a:gridCol w="2709333">
+                  <a:extLst>
+                    <a:ext uri="{9D8B030D-6E8A-4147-A177-3AD203B41FA5}">
+                      <a16:colId xmlns:a16="http://schemas.microsoft.com/office/drawing/2014/main" val="739322558"/>
+                    </a:ext>
+                  </a:extLst>
+                </a:gridCol>
+                <a:gridCol w="2709333">
+                  <a:extLst>
+                    <a:ext uri="{9D8B030D-6E8A-4147-A177-3AD203B41FA5}">
+                      <a16:colId xmlns:a16="http://schemas.microsoft.com/office/drawing/2014/main" val="3768447142"/>
+                    </a:ext>
+                  </a:extLst>
+                </a:gridCol>
+                <a:gridCol w="2709333">
+                  <a:extLst>
+                    <a:ext uri="{9D8B030D-6E8A-4147-A177-3AD203B41FA5}">
+                      <a16:colId xmlns:a16="http://schemas.microsoft.com/office/drawing/2014/main" val="199933871"/>
+                    </a:ext>
+                  </a:extLst>
+                </a:gridCol>
+              </a:tblGrid>
+              <a:tr h="370840">
+                <a:tc>
+                  <a:txBody>
+                    <a:bodyPr/>
+                    <a:lstStyle/>
+                    <a:p>
+                      <a:r>
+                        <a:rPr lang="en-US" dirty="0"/>
+                        <a:t>TABLE</a:t>
+                      </a:r>
+                      <a:endParaRPr lang="en-IN" dirty="0"/>
+                    </a:p>
+                  </a:txBody>
+                  <a:tcPr/>
+                </a:tc>
+                <a:tc>
+                  <a:txBody>
+                    <a:bodyPr/>
+                    <a:lstStyle/>
+                    <a:p>
+                      <a:r>
+                        <a:rPr lang="en-US" dirty="0"/>
+                        <a:t>ROLE</a:t>
+                      </a:r>
+                      <a:endParaRPr lang="en-IN" dirty="0"/>
+                    </a:p>
+                  </a:txBody>
+                  <a:tcPr/>
+                </a:tc>
+                <a:tc>
+                  <a:txBody>
+                    <a:bodyPr/>
+                    <a:lstStyle/>
+                    <a:p>
+                      <a:endParaRPr lang="en-IN"/>
+                    </a:p>
+                  </a:txBody>
+                  <a:tcPr/>
+                </a:tc>
+                <a:extLst>
+                  <a:ext uri="{0D108BD9-81ED-4DB2-BD59-A6C34878D82A}">
+                    <a16:rowId xmlns:a16="http://schemas.microsoft.com/office/drawing/2014/main" val="706316532"/>
+                  </a:ext>
+                </a:extLst>
+              </a:tr>
+              <a:tr h="370840">
+                <a:tc>
+                  <a:txBody>
+                    <a:bodyPr/>
+                    <a:lstStyle/>
+                    <a:p>
+                      <a:r>
+                        <a:rPr lang="en-US" dirty="0"/>
+                        <a:t>ROLEID</a:t>
+                      </a:r>
+                      <a:endParaRPr lang="en-IN" dirty="0"/>
+                    </a:p>
+                  </a:txBody>
+                  <a:tcPr/>
+                </a:tc>
+                <a:tc>
+                  <a:txBody>
+                    <a:bodyPr/>
+                    <a:lstStyle/>
+                    <a:p>
+                      <a:r>
+                        <a:rPr lang="en-US" dirty="0"/>
+                        <a:t>PRIMARY KEY</a:t>
+                      </a:r>
+                      <a:endParaRPr lang="en-IN" dirty="0"/>
+                    </a:p>
+                  </a:txBody>
+                  <a:tcPr/>
+                </a:tc>
+                <a:tc>
+                  <a:txBody>
+                    <a:bodyPr/>
+                    <a:lstStyle/>
+                    <a:p>
+                      <a:endParaRPr lang="en-IN"/>
+                    </a:p>
+                  </a:txBody>
+                  <a:tcPr/>
+                </a:tc>
+                <a:extLst>
+                  <a:ext uri="{0D108BD9-81ED-4DB2-BD59-A6C34878D82A}">
+                    <a16:rowId xmlns:a16="http://schemas.microsoft.com/office/drawing/2014/main" val="301851593"/>
+                  </a:ext>
+                </a:extLst>
+              </a:tr>
+              <a:tr h="370840">
+                <a:tc>
+                  <a:txBody>
+                    <a:bodyPr/>
+                    <a:lstStyle/>
+                    <a:p>
+                      <a:r>
+                        <a:rPr lang="en-US" dirty="0"/>
+                        <a:t>ROLENAME</a:t>
+                      </a:r>
+                      <a:endParaRPr lang="en-IN" dirty="0"/>
+                    </a:p>
+                  </a:txBody>
+                  <a:tcPr/>
+                </a:tc>
+                <a:tc>
+                  <a:txBody>
+                    <a:bodyPr/>
+                    <a:lstStyle/>
+                    <a:p>
+                      <a:r>
+                        <a:rPr lang="en-US" dirty="0"/>
+                        <a:t>STRING</a:t>
+                      </a:r>
+                      <a:endParaRPr lang="en-IN" dirty="0"/>
+                    </a:p>
+                  </a:txBody>
+                  <a:tcPr/>
+                </a:tc>
+                <a:tc>
+                  <a:txBody>
+                    <a:bodyPr/>
+                    <a:lstStyle/>
+                    <a:p>
+                      <a:endParaRPr lang="en-IN" dirty="0"/>
+                    </a:p>
+                  </a:txBody>
+                  <a:tcPr/>
+                </a:tc>
+                <a:extLst>
+                  <a:ext uri="{0D108BD9-81ED-4DB2-BD59-A6C34878D82A}">
+                    <a16:rowId xmlns:a16="http://schemas.microsoft.com/office/drawing/2014/main" val="1005661982"/>
+                  </a:ext>
+                </a:extLst>
+              </a:tr>
+            </a:tbl>
+          </a:graphicData>
+        </a:graphic>
+      </p:graphicFrame>
+      <p:graphicFrame>
+        <p:nvGraphicFramePr>
+          <p:cNvPr id="6" name="Table 5">
+            <a:extLst>
+              <a:ext uri="{FF2B5EF4-FFF2-40B4-BE49-F238E27FC236}">
+                <a16:creationId xmlns:a16="http://schemas.microsoft.com/office/drawing/2014/main" id="{E85D8F3C-98B0-7877-38CF-FE6A24035E33}"/>
+              </a:ext>
+            </a:extLst>
+          </p:cNvPr>
+          <p:cNvGraphicFramePr>
+            <a:graphicFrameLocks noGrp="1"/>
+          </p:cNvGraphicFramePr>
+          <p:nvPr>
+            <p:extLst>
+              <p:ext uri="{D42A27DB-BD31-4B8C-83A1-F6EECF244321}">
+                <p14:modId xmlns:p14="http://schemas.microsoft.com/office/powerpoint/2010/main" val="3789956777"/>
+              </p:ext>
+            </p:extLst>
+          </p:nvPr>
+        </p:nvGraphicFramePr>
+        <p:xfrm>
+          <a:off x="2031999" y="4123802"/>
+          <a:ext cx="8127999" cy="1112520"/>
+        </p:xfrm>
+        <a:graphic>
+          <a:graphicData uri="http://schemas.openxmlformats.org/drawingml/2006/table">
+            <a:tbl>
+              <a:tblPr firstRow="1" bandRow="1">
+                <a:tableStyleId>{5C22544A-7EE6-4342-B048-85BDC9FD1C3A}</a:tableStyleId>
+              </a:tblPr>
+              <a:tblGrid>
+                <a:gridCol w="2709333">
+                  <a:extLst>
+                    <a:ext uri="{9D8B030D-6E8A-4147-A177-3AD203B41FA5}">
+                      <a16:colId xmlns:a16="http://schemas.microsoft.com/office/drawing/2014/main" val="739322558"/>
+                    </a:ext>
+                  </a:extLst>
+                </a:gridCol>
+                <a:gridCol w="2709333">
+                  <a:extLst>
+                    <a:ext uri="{9D8B030D-6E8A-4147-A177-3AD203B41FA5}">
+                      <a16:colId xmlns:a16="http://schemas.microsoft.com/office/drawing/2014/main" val="3768447142"/>
+                    </a:ext>
+                  </a:extLst>
+                </a:gridCol>
+                <a:gridCol w="2709333">
+                  <a:extLst>
+                    <a:ext uri="{9D8B030D-6E8A-4147-A177-3AD203B41FA5}">
+                      <a16:colId xmlns:a16="http://schemas.microsoft.com/office/drawing/2014/main" val="199933871"/>
+                    </a:ext>
+                  </a:extLst>
+                </a:gridCol>
+              </a:tblGrid>
+              <a:tr h="370840">
+                <a:tc>
+                  <a:txBody>
+                    <a:bodyPr/>
+                    <a:lstStyle/>
+                    <a:p>
+                      <a:r>
+                        <a:rPr lang="en-US" dirty="0"/>
+                        <a:t>TABLE</a:t>
+                      </a:r>
+                      <a:endParaRPr lang="en-IN" dirty="0"/>
+                    </a:p>
+                  </a:txBody>
+                  <a:tcPr/>
+                </a:tc>
+                <a:tc>
+                  <a:txBody>
+                    <a:bodyPr/>
+                    <a:lstStyle/>
+                    <a:p>
+                      <a:r>
+                        <a:rPr lang="en-US" dirty="0"/>
+                        <a:t>USERROLE</a:t>
+                      </a:r>
+                      <a:endParaRPr lang="en-IN" dirty="0"/>
+                    </a:p>
+                  </a:txBody>
+                  <a:tcPr/>
+                </a:tc>
+                <a:tc>
+                  <a:txBody>
+                    <a:bodyPr/>
+                    <a:lstStyle/>
+                    <a:p>
+                      <a:endParaRPr lang="en-IN"/>
+                    </a:p>
+                  </a:txBody>
+                  <a:tcPr/>
+                </a:tc>
+                <a:extLst>
+                  <a:ext uri="{0D108BD9-81ED-4DB2-BD59-A6C34878D82A}">
+                    <a16:rowId xmlns:a16="http://schemas.microsoft.com/office/drawing/2014/main" val="706316532"/>
+                  </a:ext>
+                </a:extLst>
+              </a:tr>
+              <a:tr h="370840">
+                <a:tc>
+                  <a:txBody>
+                    <a:bodyPr/>
+                    <a:lstStyle/>
+                    <a:p>
+                      <a:r>
+                        <a:rPr lang="en-US" dirty="0"/>
+                        <a:t>USERID</a:t>
+                      </a:r>
+                      <a:endParaRPr lang="en-IN" dirty="0"/>
+                    </a:p>
+                  </a:txBody>
+                  <a:tcPr/>
+                </a:tc>
+                <a:tc rowSpan="2">
+                  <a:txBody>
+                    <a:bodyPr/>
+                    <a:lstStyle/>
+                    <a:p>
+                      <a:endParaRPr lang="en-US" dirty="0"/>
+                    </a:p>
+                    <a:p>
+                      <a:r>
+                        <a:rPr lang="en-IN" dirty="0"/>
+                        <a:t>PRIMARY KEY</a:t>
+                      </a:r>
+                    </a:p>
+                  </a:txBody>
+                  <a:tcPr/>
+                </a:tc>
+                <a:tc>
+                  <a:txBody>
+                    <a:bodyPr/>
+                    <a:lstStyle/>
+                    <a:p>
+                      <a:endParaRPr lang="en-IN"/>
+                    </a:p>
+                  </a:txBody>
+                  <a:tcPr/>
+                </a:tc>
+                <a:extLst>
+                  <a:ext uri="{0D108BD9-81ED-4DB2-BD59-A6C34878D82A}">
+                    <a16:rowId xmlns:a16="http://schemas.microsoft.com/office/drawing/2014/main" val="301851593"/>
+                  </a:ext>
+                </a:extLst>
+              </a:tr>
+              <a:tr h="370840">
+                <a:tc>
+                  <a:txBody>
+                    <a:bodyPr/>
+                    <a:lstStyle/>
+                    <a:p>
+                      <a:r>
+                        <a:rPr lang="en-US" dirty="0"/>
+                        <a:t>ROLEID</a:t>
+                      </a:r>
+                      <a:endParaRPr lang="en-IN" dirty="0"/>
+                    </a:p>
+                  </a:txBody>
+                  <a:tcPr/>
+                </a:tc>
+                <a:tc vMerge="1">
+                  <a:txBody>
+                    <a:bodyPr/>
+                    <a:lstStyle/>
+                    <a:p>
+                      <a:endParaRPr lang="en-IN" dirty="0"/>
+                    </a:p>
+                  </a:txBody>
+                  <a:tcPr/>
+                </a:tc>
+                <a:tc>
+                  <a:txBody>
+                    <a:bodyPr/>
+                    <a:lstStyle/>
+                    <a:p>
+                      <a:endParaRPr lang="en-IN" dirty="0"/>
+                    </a:p>
+                  </a:txBody>
+                  <a:tcPr/>
+                </a:tc>
+                <a:extLst>
+                  <a:ext uri="{0D108BD9-81ED-4DB2-BD59-A6C34878D82A}">
+                    <a16:rowId xmlns:a16="http://schemas.microsoft.com/office/drawing/2014/main" val="1005661982"/>
+                  </a:ext>
+                </a:extLst>
+              </a:tr>
+            </a:tbl>
+          </a:graphicData>
+        </a:graphic>
+      </p:graphicFrame>
+      <p:sp>
+        <p:nvSpPr>
+          <p:cNvPr id="7" name="Oval 6">
+            <a:extLst>
+              <a:ext uri="{FF2B5EF4-FFF2-40B4-BE49-F238E27FC236}">
+                <a16:creationId xmlns:a16="http://schemas.microsoft.com/office/drawing/2014/main" id="{2E3C3DD2-D27F-5596-CB01-D2F7239170B1}"/>
+              </a:ext>
+            </a:extLst>
+          </p:cNvPr>
+          <p:cNvSpPr/>
+          <p:nvPr/>
+        </p:nvSpPr>
+        <p:spPr>
+          <a:xfrm>
+            <a:off x="442762" y="719666"/>
+            <a:ext cx="1078030" cy="839627"/>
+          </a:xfrm>
+          <a:prstGeom prst="ellipse">
+            <a:avLst/>
+          </a:prstGeom>
+          <a:solidFill>
+            <a:schemeClr val="accent2">
+              <a:lumMod val="40000"/>
+              <a:lumOff val="60000"/>
+            </a:schemeClr>
+          </a:solidFill>
+        </p:spPr>
+        <p:style>
+          <a:lnRef idx="2">
+            <a:schemeClr val="accent6"/>
+          </a:lnRef>
+          <a:fillRef idx="1">
+            <a:schemeClr val="lt1"/>
+          </a:fillRef>
+          <a:effectRef idx="0">
+            <a:schemeClr val="accent6"/>
+          </a:effectRef>
+          <a:fontRef idx="minor">
+            <a:schemeClr val="dk1"/>
+          </a:fontRef>
+        </p:style>
+        <p:txBody>
+          <a:bodyPr rtlCol="0" anchor="ctr"/>
+          <a:lstStyle/>
+          <a:p>
+            <a:pPr algn="ctr"/>
+            <a:r>
+              <a:rPr lang="en-US" dirty="0"/>
+              <a:t>1</a:t>
+            </a:r>
+            <a:endParaRPr lang="en-IN" dirty="0"/>
+          </a:p>
+        </p:txBody>
+      </p:sp>
+      <p:sp>
+        <p:nvSpPr>
+          <p:cNvPr id="8" name="Oval 7">
+            <a:extLst>
+              <a:ext uri="{FF2B5EF4-FFF2-40B4-BE49-F238E27FC236}">
+                <a16:creationId xmlns:a16="http://schemas.microsoft.com/office/drawing/2014/main" id="{425961C0-0683-B28D-2A27-4A2710EE6022}"/>
+              </a:ext>
+            </a:extLst>
+          </p:cNvPr>
+          <p:cNvSpPr/>
+          <p:nvPr/>
+        </p:nvSpPr>
+        <p:spPr>
+          <a:xfrm>
+            <a:off x="720290" y="5566120"/>
+            <a:ext cx="1078030" cy="839627"/>
+          </a:xfrm>
+          <a:prstGeom prst="ellipse">
+            <a:avLst/>
+          </a:prstGeom>
+          <a:solidFill>
+            <a:schemeClr val="accent2">
+              <a:lumMod val="40000"/>
+              <a:lumOff val="60000"/>
+            </a:schemeClr>
+          </a:solidFill>
+        </p:spPr>
+        <p:style>
+          <a:lnRef idx="2">
+            <a:schemeClr val="accent6"/>
+          </a:lnRef>
+          <a:fillRef idx="1">
+            <a:schemeClr val="lt1"/>
+          </a:fillRef>
+          <a:effectRef idx="0">
+            <a:schemeClr val="accent6"/>
+          </a:effectRef>
+          <a:fontRef idx="minor">
+            <a:schemeClr val="dk1"/>
+          </a:fontRef>
+        </p:style>
+        <p:txBody>
+          <a:bodyPr rtlCol="0" anchor="ctr"/>
+          <a:lstStyle/>
+          <a:p>
+            <a:pPr algn="ctr"/>
+            <a:r>
+              <a:rPr lang="en-US" dirty="0"/>
+              <a:t>2</a:t>
+            </a:r>
+            <a:endParaRPr lang="en-IN" dirty="0"/>
+          </a:p>
+        </p:txBody>
+      </p:sp>
+      <p:sp>
+        <p:nvSpPr>
+          <p:cNvPr id="9" name="TextBox 8">
+            <a:extLst>
+              <a:ext uri="{FF2B5EF4-FFF2-40B4-BE49-F238E27FC236}">
+                <a16:creationId xmlns:a16="http://schemas.microsoft.com/office/drawing/2014/main" id="{74FD6276-93B1-CFD6-B880-8E3DC1A6206D}"/>
+              </a:ext>
+            </a:extLst>
+          </p:cNvPr>
+          <p:cNvSpPr txBox="1"/>
+          <p:nvPr/>
+        </p:nvSpPr>
+        <p:spPr>
+          <a:xfrm>
+            <a:off x="1934678" y="5385768"/>
+            <a:ext cx="9182501" cy="1477328"/>
+          </a:xfrm>
+          <a:prstGeom prst="rect">
+            <a:avLst/>
+          </a:prstGeom>
+          <a:noFill/>
+        </p:spPr>
+        <p:txBody>
+          <a:bodyPr wrap="square" rtlCol="0">
+            <a:spAutoFit/>
+          </a:bodyPr>
+          <a:lstStyle/>
+          <a:p>
+            <a:r>
+              <a:rPr lang="en-US" dirty="0"/>
+              <a:t>CREATE A USER 					&gt; Create 4 users</a:t>
+            </a:r>
+          </a:p>
+          <a:p>
+            <a:r>
+              <a:rPr lang="en-US" dirty="0"/>
+              <a:t>CREATE A ROLE					&gt; Create 3 Roles</a:t>
+            </a:r>
+          </a:p>
+          <a:p>
+            <a:r>
+              <a:rPr lang="en-US" dirty="0"/>
+              <a:t>CREATE A USERROLE MAPPING 			&gt; Assign User 1 Role1</a:t>
+            </a:r>
+          </a:p>
+          <a:p>
+            <a:r>
+              <a:rPr lang="en-US" dirty="0"/>
+              <a:t>						&gt; Assign User 2 Role 2</a:t>
+            </a:r>
+          </a:p>
+          <a:p>
+            <a:r>
+              <a:rPr lang="en-US" dirty="0"/>
+              <a:t>						&gt; Assign User 3 Role 1 and 2 </a:t>
+            </a:r>
+            <a:endParaRPr lang="en-IN" dirty="0"/>
+          </a:p>
+        </p:txBody>
+      </p:sp>
+    </p:spTree>
+    <p:extLst>
+      <p:ext uri="{BB962C8B-B14F-4D97-AF65-F5344CB8AC3E}">
+        <p14:creationId xmlns:p14="http://schemas.microsoft.com/office/powerpoint/2010/main" val="2679230"/>
+      </p:ext>
+    </p:extLst>
+  </p:cSld>
+  <p:clrMapOvr>
+    <a:masterClrMapping/>
+  </p:clrMapOvr>
+</p:sld>
+</file>
+
+<file path=ppt/slides/slide14.xml><?xml version="1.0" encoding="utf-8"?>
+<p:sld xmlns:a="http://schemas.openxmlformats.org/drawingml/2006/main" xmlns:r="http://schemas.openxmlformats.org/officeDocument/2006/relationships" xmlns:p="http://schemas.openxmlformats.org/presentationml/2006/main">
+  <p:cSld>
+    <p:spTree>
+      <p:nvGrpSpPr>
+        <p:cNvPr id="1" name="">
+          <a:extLst>
+            <a:ext uri="{FF2B5EF4-FFF2-40B4-BE49-F238E27FC236}">
+              <a16:creationId xmlns:a16="http://schemas.microsoft.com/office/drawing/2014/main" id="{2D5CB3F8-B5BD-FE2B-89A6-114937AD94CD}"/>
+            </a:ext>
+          </a:extLst>
+        </p:cNvPr>
+        <p:cNvGrpSpPr/>
+        <p:nvPr/>
+      </p:nvGrpSpPr>
+      <p:grpSpPr>
+        <a:xfrm>
+          <a:off x="0" y="0"/>
+          <a:ext cx="0" cy="0"/>
+          <a:chOff x="0" y="0"/>
+          <a:chExt cx="0" cy="0"/>
+        </a:xfrm>
+      </p:grpSpPr>
+      <p:sp>
+        <p:nvSpPr>
+          <p:cNvPr id="7" name="Oval 6">
+            <a:extLst>
+              <a:ext uri="{FF2B5EF4-FFF2-40B4-BE49-F238E27FC236}">
+                <a16:creationId xmlns:a16="http://schemas.microsoft.com/office/drawing/2014/main" id="{9AA59A7A-9D67-7DF0-3946-39FF17B972AD}"/>
+              </a:ext>
+            </a:extLst>
+          </p:cNvPr>
+          <p:cNvSpPr/>
+          <p:nvPr/>
+        </p:nvSpPr>
+        <p:spPr>
+          <a:xfrm>
+            <a:off x="519764" y="719666"/>
+            <a:ext cx="1078030" cy="839627"/>
+          </a:xfrm>
+          <a:prstGeom prst="ellipse">
+            <a:avLst/>
+          </a:prstGeom>
+          <a:solidFill>
+            <a:schemeClr val="accent2">
+              <a:lumMod val="40000"/>
+              <a:lumOff val="60000"/>
+            </a:schemeClr>
+          </a:solidFill>
+        </p:spPr>
+        <p:style>
+          <a:lnRef idx="2">
+            <a:schemeClr val="accent6"/>
+          </a:lnRef>
+          <a:fillRef idx="1">
+            <a:schemeClr val="lt1"/>
+          </a:fillRef>
+          <a:effectRef idx="0">
+            <a:schemeClr val="accent6"/>
+          </a:effectRef>
+          <a:fontRef idx="minor">
+            <a:schemeClr val="dk1"/>
+          </a:fontRef>
+        </p:style>
+        <p:txBody>
+          <a:bodyPr rtlCol="0" anchor="ctr"/>
+          <a:lstStyle/>
+          <a:p>
+            <a:pPr algn="ctr"/>
+            <a:r>
+              <a:rPr lang="en-US" dirty="0"/>
+              <a:t>3</a:t>
+            </a:r>
+            <a:endParaRPr lang="en-IN" dirty="0"/>
+          </a:p>
+        </p:txBody>
+      </p:sp>
+      <p:sp>
+        <p:nvSpPr>
+          <p:cNvPr id="2" name="TextBox 1">
+            <a:extLst>
+              <a:ext uri="{FF2B5EF4-FFF2-40B4-BE49-F238E27FC236}">
+                <a16:creationId xmlns:a16="http://schemas.microsoft.com/office/drawing/2014/main" id="{9F266863-2B75-581B-048E-B32352155D3E}"/>
+              </a:ext>
+            </a:extLst>
+          </p:cNvPr>
+          <p:cNvSpPr txBox="1"/>
+          <p:nvPr/>
+        </p:nvSpPr>
+        <p:spPr>
+          <a:xfrm>
+            <a:off x="2146434" y="587141"/>
+            <a:ext cx="8566484" cy="3139321"/>
+          </a:xfrm>
+          <a:prstGeom prst="rect">
+            <a:avLst/>
+          </a:prstGeom>
+          <a:noFill/>
+        </p:spPr>
+        <p:txBody>
+          <a:bodyPr wrap="square" rtlCol="0">
+            <a:spAutoFit/>
+          </a:bodyPr>
+          <a:lstStyle/>
+          <a:p>
+            <a:r>
+              <a:rPr lang="en-US" dirty="0"/>
+              <a:t>Create &amp; register a JWT Service Instance </a:t>
+            </a:r>
+          </a:p>
+          <a:p>
+            <a:endParaRPr lang="en-US" dirty="0"/>
+          </a:p>
+          <a:p>
+            <a:r>
+              <a:rPr lang="en-US" dirty="0"/>
+              <a:t>This instance will create a token for a user</a:t>
+            </a:r>
+          </a:p>
+          <a:p>
+            <a:endParaRPr lang="en-US" dirty="0"/>
+          </a:p>
+          <a:p>
+            <a:r>
+              <a:rPr lang="en-US" dirty="0"/>
+              <a:t>	I know the user name </a:t>
+            </a:r>
+          </a:p>
+          <a:p>
+            <a:r>
+              <a:rPr lang="en-US" dirty="0"/>
+              <a:t>	From table I can get the list of roles </a:t>
+            </a:r>
+          </a:p>
+          <a:p>
+            <a:r>
+              <a:rPr lang="en-US" dirty="0"/>
+              <a:t>	In token</a:t>
+            </a:r>
+          </a:p>
+          <a:p>
+            <a:r>
+              <a:rPr lang="en-US" dirty="0"/>
+              <a:t>		Set the user name </a:t>
+            </a:r>
+          </a:p>
+          <a:p>
+            <a:r>
+              <a:rPr lang="en-US" dirty="0"/>
+              <a:t>		Set the roles </a:t>
+            </a:r>
+          </a:p>
+          <a:p>
+            <a:r>
+              <a:rPr lang="en-US" dirty="0"/>
+              <a:t>	return token</a:t>
+            </a:r>
+          </a:p>
+          <a:p>
+            <a:endParaRPr lang="en-IN" dirty="0"/>
+          </a:p>
+        </p:txBody>
+      </p:sp>
+      <p:sp>
+        <p:nvSpPr>
+          <p:cNvPr id="3" name="Oval 2">
+            <a:extLst>
+              <a:ext uri="{FF2B5EF4-FFF2-40B4-BE49-F238E27FC236}">
+                <a16:creationId xmlns:a16="http://schemas.microsoft.com/office/drawing/2014/main" id="{3DE236DA-79DC-8C4B-279F-40DC0F32EC1B}"/>
+              </a:ext>
+            </a:extLst>
+          </p:cNvPr>
+          <p:cNvSpPr/>
+          <p:nvPr/>
+        </p:nvSpPr>
+        <p:spPr>
+          <a:xfrm>
+            <a:off x="797293" y="4269784"/>
+            <a:ext cx="1078030" cy="839627"/>
+          </a:xfrm>
+          <a:prstGeom prst="ellipse">
+            <a:avLst/>
+          </a:prstGeom>
+          <a:solidFill>
+            <a:schemeClr val="accent2">
+              <a:lumMod val="40000"/>
+              <a:lumOff val="60000"/>
+            </a:schemeClr>
+          </a:solidFill>
+        </p:spPr>
+        <p:style>
+          <a:lnRef idx="2">
+            <a:schemeClr val="accent6"/>
+          </a:lnRef>
+          <a:fillRef idx="1">
+            <a:schemeClr val="lt1"/>
+          </a:fillRef>
+          <a:effectRef idx="0">
+            <a:schemeClr val="accent6"/>
+          </a:effectRef>
+          <a:fontRef idx="minor">
+            <a:schemeClr val="dk1"/>
+          </a:fontRef>
+        </p:style>
+        <p:txBody>
+          <a:bodyPr rtlCol="0" anchor="ctr"/>
+          <a:lstStyle/>
+          <a:p>
+            <a:pPr algn="ctr"/>
+            <a:r>
+              <a:rPr lang="en-US" dirty="0"/>
+              <a:t>4</a:t>
+            </a:r>
+            <a:endParaRPr lang="en-IN" dirty="0"/>
+          </a:p>
+        </p:txBody>
+      </p:sp>
+      <p:sp>
+        <p:nvSpPr>
+          <p:cNvPr id="10" name="TextBox 9">
+            <a:extLst>
+              <a:ext uri="{FF2B5EF4-FFF2-40B4-BE49-F238E27FC236}">
+                <a16:creationId xmlns:a16="http://schemas.microsoft.com/office/drawing/2014/main" id="{89C621E8-6414-42D3-3753-097442ECC6FC}"/>
+              </a:ext>
+            </a:extLst>
+          </p:cNvPr>
+          <p:cNvSpPr txBox="1"/>
+          <p:nvPr/>
+        </p:nvSpPr>
+        <p:spPr>
+          <a:xfrm>
+            <a:off x="2250708" y="3915878"/>
+            <a:ext cx="8566484" cy="2308324"/>
+          </a:xfrm>
+          <a:prstGeom prst="rect">
+            <a:avLst/>
+          </a:prstGeom>
+          <a:noFill/>
+        </p:spPr>
+        <p:txBody>
+          <a:bodyPr wrap="square" rtlCol="0">
+            <a:spAutoFit/>
+          </a:bodyPr>
+          <a:lstStyle/>
+          <a:p>
+            <a:r>
+              <a:rPr lang="en-US" dirty="0"/>
+              <a:t>Create a /login API </a:t>
+            </a:r>
+          </a:p>
+          <a:p>
+            <a:r>
+              <a:rPr lang="en-US" dirty="0"/>
+              <a:t>	Username</a:t>
+            </a:r>
+          </a:p>
+          <a:p>
+            <a:r>
+              <a:rPr lang="en-US" dirty="0"/>
+              <a:t>	Password</a:t>
+            </a:r>
+          </a:p>
+          <a:p>
+            <a:endParaRPr lang="en-US" dirty="0"/>
+          </a:p>
+          <a:p>
+            <a:r>
+              <a:rPr lang="en-US" dirty="0"/>
+              <a:t>Calls </a:t>
+            </a:r>
+            <a:r>
+              <a:rPr lang="en-US" dirty="0" err="1"/>
+              <a:t>Service.VerifyPasswordHash</a:t>
+            </a:r>
+            <a:endParaRPr lang="en-US" dirty="0"/>
+          </a:p>
+          <a:p>
+            <a:r>
+              <a:rPr lang="en-US" dirty="0"/>
+              <a:t>          IF OK, service will generate the token</a:t>
+            </a:r>
+          </a:p>
+          <a:p>
+            <a:r>
+              <a:rPr lang="en-US" dirty="0"/>
+              <a:t>          controller will return the token. </a:t>
+            </a:r>
+          </a:p>
+          <a:p>
+            <a:endParaRPr lang="en-IN" dirty="0"/>
+          </a:p>
+        </p:txBody>
+      </p:sp>
+    </p:spTree>
+    <p:extLst>
+      <p:ext uri="{BB962C8B-B14F-4D97-AF65-F5344CB8AC3E}">
+        <p14:creationId xmlns:p14="http://schemas.microsoft.com/office/powerpoint/2010/main" val="519882447"/>
+      </p:ext>
+    </p:extLst>
+  </p:cSld>
+  <p:clrMapOvr>
+    <a:masterClrMapping/>
+  </p:clrMapOvr>
+</p:sld>
+</file>
+
+<file path=ppt/slides/slide15.xml><?xml version="1.0" encoding="utf-8"?>
+<p:sld xmlns:a="http://schemas.openxmlformats.org/drawingml/2006/main" xmlns:r="http://schemas.openxmlformats.org/officeDocument/2006/relationships" xmlns:p="http://schemas.openxmlformats.org/presentationml/2006/main">
+  <p:cSld>
+    <p:spTree>
+      <p:nvGrpSpPr>
+        <p:cNvPr id="1" name=""/>
+        <p:cNvGrpSpPr/>
+        <p:nvPr/>
+      </p:nvGrpSpPr>
+      <p:grpSpPr>
+        <a:xfrm>
+          <a:off x="0" y="0"/>
+          <a:ext cx="0" cy="0"/>
+          <a:chOff x="0" y="0"/>
+          <a:chExt cx="0" cy="0"/>
+        </a:xfrm>
+      </p:grpSpPr>
+      <p:sp>
+        <p:nvSpPr>
+          <p:cNvPr id="2" name="Title 1">
+            <a:extLst>
+              <a:ext uri="{FF2B5EF4-FFF2-40B4-BE49-F238E27FC236}">
+                <a16:creationId xmlns:a16="http://schemas.microsoft.com/office/drawing/2014/main" id="{62023551-CA0B-6DC2-7893-6132E7B356C3}"/>
+              </a:ext>
+            </a:extLst>
+          </p:cNvPr>
+          <p:cNvSpPr>
+            <a:spLocks noGrp="1"/>
+          </p:cNvSpPr>
+          <p:nvPr>
+            <p:ph type="title"/>
+          </p:nvPr>
+        </p:nvSpPr>
+        <p:spPr/>
+        <p:txBody>
+          <a:bodyPr/>
+          <a:lstStyle/>
+          <a:p>
+            <a:r>
+              <a:rPr lang="en-US" dirty="0"/>
+              <a:t>Using built in </a:t>
+            </a:r>
+            <a:r>
+              <a:rPr lang="en-US"/>
+              <a:t>password Hasher</a:t>
+            </a:r>
+            <a:endParaRPr lang="en-IN"/>
+          </a:p>
+        </p:txBody>
+      </p:sp>
+      <p:sp>
+        <p:nvSpPr>
+          <p:cNvPr id="3" name="Content Placeholder 2">
+            <a:extLst>
+              <a:ext uri="{FF2B5EF4-FFF2-40B4-BE49-F238E27FC236}">
+                <a16:creationId xmlns:a16="http://schemas.microsoft.com/office/drawing/2014/main" id="{67D9BA35-764E-EE11-E3D7-E2BC49E06A15}"/>
+              </a:ext>
+            </a:extLst>
+          </p:cNvPr>
+          <p:cNvSpPr>
+            <a:spLocks noGrp="1"/>
+          </p:cNvSpPr>
+          <p:nvPr>
+            <p:ph idx="1"/>
+          </p:nvPr>
+        </p:nvSpPr>
+        <p:spPr/>
+        <p:txBody>
+          <a:bodyPr/>
+          <a:lstStyle/>
+          <a:p>
+            <a:r>
+              <a:rPr lang="en-US" dirty="0" err="1"/>
+              <a:t>PasswordHasher</a:t>
+            </a:r>
+            <a:r>
+              <a:rPr lang="en-US" dirty="0"/>
+              <a:t>&lt;User&gt; </a:t>
+            </a:r>
+          </a:p>
+          <a:p>
+            <a:endParaRPr lang="en-US" dirty="0"/>
+          </a:p>
+          <a:p>
+            <a:r>
+              <a:rPr lang="en-US" dirty="0"/>
+              <a:t>From </a:t>
+            </a:r>
+            <a:r>
+              <a:rPr lang="en-US" dirty="0" err="1"/>
+              <a:t>IPasswordHasher</a:t>
+            </a:r>
+            <a:r>
+              <a:rPr lang="en-US" dirty="0"/>
+              <a:t>&lt;T&gt; </a:t>
+            </a:r>
+            <a:endParaRPr lang="en-IN" dirty="0"/>
+          </a:p>
+        </p:txBody>
+      </p:sp>
+    </p:spTree>
+    <p:extLst>
+      <p:ext uri="{BB962C8B-B14F-4D97-AF65-F5344CB8AC3E}">
+        <p14:creationId xmlns:p14="http://schemas.microsoft.com/office/powerpoint/2010/main" val="4195254663"/>
+      </p:ext>
+    </p:extLst>
+  </p:cSld>
+  <p:clrMapOvr>
+    <a:masterClrMapping/>
+  </p:clrMapOvr>
+</p:sld>
+</file>
+
+<file path=ppt/slides/slide16.xml><?xml version="1.0" encoding="utf-8"?>
+<p:sld xmlns:a="http://schemas.openxmlformats.org/drawingml/2006/main" xmlns:r="http://schemas.openxmlformats.org/officeDocument/2006/relationships" xmlns:p="http://schemas.openxmlformats.org/presentationml/2006/main">
+  <p:cSld>
+    <p:spTree>
+      <p:nvGrpSpPr>
+        <p:cNvPr id="1" name="">
+          <a:extLst>
+            <a:ext uri="{FF2B5EF4-FFF2-40B4-BE49-F238E27FC236}">
+              <a16:creationId xmlns:a16="http://schemas.microsoft.com/office/drawing/2014/main" id="{0416F8C9-24D5-CFE5-C877-C109153E5E8F}"/>
+            </a:ext>
+          </a:extLst>
+        </p:cNvPr>
+        <p:cNvGrpSpPr/>
+        <p:nvPr/>
+      </p:nvGrpSpPr>
+      <p:grpSpPr>
+        <a:xfrm>
+          <a:off x="0" y="0"/>
+          <a:ext cx="0" cy="0"/>
+          <a:chOff x="0" y="0"/>
+          <a:chExt cx="0" cy="0"/>
+        </a:xfrm>
+      </p:grpSpPr>
+      <p:sp>
+        <p:nvSpPr>
+          <p:cNvPr id="2" name="Title 1">
+            <a:extLst>
+              <a:ext uri="{FF2B5EF4-FFF2-40B4-BE49-F238E27FC236}">
+                <a16:creationId xmlns:a16="http://schemas.microsoft.com/office/drawing/2014/main" id="{C5E0B2B6-80AD-E6B7-DD46-AE98D17262B2}"/>
+              </a:ext>
+            </a:extLst>
+          </p:cNvPr>
+          <p:cNvSpPr>
+            <a:spLocks noGrp="1"/>
+          </p:cNvSpPr>
+          <p:nvPr>
+            <p:ph type="title"/>
+          </p:nvPr>
+        </p:nvSpPr>
+        <p:spPr/>
+        <p:txBody>
+          <a:bodyPr/>
+          <a:lstStyle/>
+          <a:p>
+            <a:r>
+              <a:rPr lang="en-US" dirty="0"/>
+              <a:t>Getting Started</a:t>
+            </a:r>
+            <a:endParaRPr lang="en-IN" dirty="0"/>
+          </a:p>
+        </p:txBody>
+      </p:sp>
+      <p:sp>
+        <p:nvSpPr>
+          <p:cNvPr id="3" name="Content Placeholder 2">
+            <a:extLst>
+              <a:ext uri="{FF2B5EF4-FFF2-40B4-BE49-F238E27FC236}">
+                <a16:creationId xmlns:a16="http://schemas.microsoft.com/office/drawing/2014/main" id="{2882D510-EBA0-9BFE-0BE7-27BFECF7185C}"/>
+              </a:ext>
+            </a:extLst>
+          </p:cNvPr>
+          <p:cNvSpPr>
+            <a:spLocks noGrp="1"/>
+          </p:cNvSpPr>
+          <p:nvPr>
+            <p:ph idx="1"/>
+          </p:nvPr>
+        </p:nvSpPr>
+        <p:spPr/>
+        <p:txBody>
+          <a:bodyPr/>
+          <a:lstStyle/>
+          <a:p>
+            <a:r>
+              <a:rPr lang="en-US" dirty="0"/>
+              <a:t>Your “SPRINT BACKLOG #2”</a:t>
+            </a:r>
+          </a:p>
+          <a:p>
+            <a:pPr lvl="1"/>
+            <a:endParaRPr lang="en-IN" dirty="0"/>
+          </a:p>
+          <a:p>
+            <a:pPr lvl="1"/>
+            <a:r>
+              <a:rPr lang="en-IN" dirty="0"/>
+              <a:t>Bank Employees Entities</a:t>
+            </a:r>
+          </a:p>
+          <a:p>
+            <a:pPr lvl="1"/>
+            <a:r>
+              <a:rPr lang="en-IN" dirty="0"/>
+              <a:t>Roles and Permissions Entities</a:t>
+            </a:r>
+          </a:p>
+          <a:p>
+            <a:pPr lvl="1"/>
+            <a:r>
+              <a:rPr lang="en-IN" dirty="0" err="1"/>
+              <a:t>JWTService</a:t>
+            </a:r>
+            <a:endParaRPr lang="en-IN" dirty="0"/>
+          </a:p>
+          <a:p>
+            <a:pPr lvl="1"/>
+            <a:r>
+              <a:rPr lang="en-IN" dirty="0"/>
+              <a:t>/login API </a:t>
+            </a:r>
+          </a:p>
+          <a:p>
+            <a:pPr lvl="1"/>
+            <a:r>
+              <a:rPr lang="en-IN" dirty="0"/>
+              <a:t>Authorization</a:t>
+            </a:r>
+          </a:p>
+          <a:p>
+            <a:pPr lvl="1"/>
+            <a:r>
+              <a:rPr lang="en-IN" dirty="0"/>
+              <a:t>CRUD operations</a:t>
+            </a:r>
+          </a:p>
+          <a:p>
+            <a:pPr lvl="2"/>
+            <a:r>
+              <a:rPr lang="en-IN" dirty="0"/>
+              <a:t>Create Users</a:t>
+            </a:r>
+          </a:p>
+          <a:p>
+            <a:pPr lvl="2"/>
+            <a:r>
+              <a:rPr lang="en-IN" dirty="0"/>
+              <a:t>……..</a:t>
+            </a:r>
+          </a:p>
+        </p:txBody>
+      </p:sp>
+      <p:sp>
+        <p:nvSpPr>
+          <p:cNvPr id="5" name="TextBox 4">
+            <a:extLst>
+              <a:ext uri="{FF2B5EF4-FFF2-40B4-BE49-F238E27FC236}">
+                <a16:creationId xmlns:a16="http://schemas.microsoft.com/office/drawing/2014/main" id="{21A5720E-8F67-5212-CB62-D1A453948AC4}"/>
+              </a:ext>
+            </a:extLst>
+          </p:cNvPr>
+          <p:cNvSpPr txBox="1"/>
+          <p:nvPr/>
+        </p:nvSpPr>
+        <p:spPr>
+          <a:xfrm>
+            <a:off x="5339615" y="1963588"/>
+            <a:ext cx="6097604" cy="646331"/>
+          </a:xfrm>
+          <a:prstGeom prst="rect">
+            <a:avLst/>
+          </a:prstGeom>
+          <a:noFill/>
+        </p:spPr>
+        <p:txBody>
+          <a:bodyPr wrap="square">
+            <a:spAutoFit/>
+          </a:bodyPr>
+          <a:lstStyle/>
+          <a:p>
+            <a:pPr lvl="1"/>
+            <a:r>
+              <a:rPr lang="en-IN" dirty="0"/>
+              <a:t>EXPECTED: 	Screenshot evidence_ALL_API.png </a:t>
+            </a:r>
+            <a:r>
+              <a:rPr lang="en-IN" dirty="0">
+                <a:sym typeface="Wingdings" panose="05000000000000000000" pitchFamily="2" charset="2"/>
+              </a:rPr>
+              <a:t> </a:t>
+            </a:r>
+          </a:p>
+          <a:p>
+            <a:pPr lvl="1"/>
+            <a:r>
+              <a:rPr lang="en-IN" dirty="0">
+                <a:sym typeface="Wingdings" panose="05000000000000000000" pitchFamily="2" charset="2"/>
+              </a:rPr>
+              <a:t>	                   preferred POSTMAN COLLECTION</a:t>
+            </a:r>
+          </a:p>
+        </p:txBody>
+      </p:sp>
+    </p:spTree>
+    <p:extLst>
+      <p:ext uri="{BB962C8B-B14F-4D97-AF65-F5344CB8AC3E}">
+        <p14:creationId xmlns:p14="http://schemas.microsoft.com/office/powerpoint/2010/main" val="2153046536"/>
+      </p:ext>
+    </p:extLst>
+  </p:cSld>
+  <p:clrMapOvr>
+    <a:masterClrMapping/>
+  </p:clrMapOvr>
+</p:sld>
+</file>
+
+<file path=ppt/slides/slide17.xml><?xml version="1.0" encoding="utf-8"?>
+<p:sld xmlns:a="http://schemas.openxmlformats.org/drawingml/2006/main" xmlns:r="http://schemas.openxmlformats.org/officeDocument/2006/relationships" xmlns:p="http://schemas.openxmlformats.org/presentationml/2006/main">
+  <p:cSld>
+    <p:spTree>
+      <p:nvGrpSpPr>
+        <p:cNvPr id="1" name="">
+          <a:extLst>
+            <a:ext uri="{FF2B5EF4-FFF2-40B4-BE49-F238E27FC236}">
+              <a16:creationId xmlns:a16="http://schemas.microsoft.com/office/drawing/2014/main" id="{B89E7A26-652F-5F01-3629-83CD23B912E3}"/>
+            </a:ext>
+          </a:extLst>
+        </p:cNvPr>
+        <p:cNvGrpSpPr/>
+        <p:nvPr/>
+      </p:nvGrpSpPr>
+      <p:grpSpPr>
+        <a:xfrm>
+          <a:off x="0" y="0"/>
+          <a:ext cx="0" cy="0"/>
+          <a:chOff x="0" y="0"/>
+          <a:chExt cx="0" cy="0"/>
+        </a:xfrm>
+      </p:grpSpPr>
+      <p:sp>
+        <p:nvSpPr>
+          <p:cNvPr id="2" name="Title 1">
+            <a:extLst>
+              <a:ext uri="{FF2B5EF4-FFF2-40B4-BE49-F238E27FC236}">
+                <a16:creationId xmlns:a16="http://schemas.microsoft.com/office/drawing/2014/main" id="{6A03A440-506A-EFE6-F04E-7EA985E05C11}"/>
+              </a:ext>
+            </a:extLst>
+          </p:cNvPr>
+          <p:cNvSpPr>
+            <a:spLocks noGrp="1"/>
+          </p:cNvSpPr>
+          <p:nvPr>
+            <p:ph type="title"/>
+          </p:nvPr>
+        </p:nvSpPr>
+        <p:spPr/>
+        <p:txBody>
+          <a:bodyPr/>
+          <a:lstStyle/>
+          <a:p>
+            <a:r>
+              <a:rPr lang="en-US" dirty="0"/>
+              <a:t>Getting Started</a:t>
+            </a:r>
+            <a:endParaRPr lang="en-IN" dirty="0"/>
+          </a:p>
+        </p:txBody>
+      </p:sp>
+      <p:sp>
+        <p:nvSpPr>
+          <p:cNvPr id="3" name="Content Placeholder 2">
+            <a:extLst>
+              <a:ext uri="{FF2B5EF4-FFF2-40B4-BE49-F238E27FC236}">
+                <a16:creationId xmlns:a16="http://schemas.microsoft.com/office/drawing/2014/main" id="{9908201B-34CF-6965-195E-BEA745F87629}"/>
+              </a:ext>
+            </a:extLst>
+          </p:cNvPr>
+          <p:cNvSpPr>
+            <a:spLocks noGrp="1"/>
+          </p:cNvSpPr>
+          <p:nvPr>
+            <p:ph idx="1"/>
+          </p:nvPr>
+        </p:nvSpPr>
+        <p:spPr/>
+        <p:txBody>
+          <a:bodyPr/>
+          <a:lstStyle/>
+          <a:p>
+            <a:r>
+              <a:rPr lang="en-US" dirty="0"/>
+              <a:t>Your “SPRINT BACKLOG #3”</a:t>
+            </a:r>
+          </a:p>
+          <a:p>
+            <a:pPr lvl="1"/>
+            <a:endParaRPr lang="en-IN" dirty="0"/>
+          </a:p>
+          <a:p>
+            <a:pPr lvl="1"/>
+            <a:r>
+              <a:rPr lang="en-IN" dirty="0"/>
+              <a:t>Identify Common Code and move to Shared Assembly  or re-usable methods</a:t>
+            </a:r>
+          </a:p>
+        </p:txBody>
+      </p:sp>
+      <p:sp>
+        <p:nvSpPr>
+          <p:cNvPr id="4" name="TextBox 3">
+            <a:extLst>
+              <a:ext uri="{FF2B5EF4-FFF2-40B4-BE49-F238E27FC236}">
+                <a16:creationId xmlns:a16="http://schemas.microsoft.com/office/drawing/2014/main" id="{148BFB87-681C-003D-FF5D-15675D331CA3}"/>
+              </a:ext>
+            </a:extLst>
+          </p:cNvPr>
+          <p:cNvSpPr txBox="1"/>
+          <p:nvPr/>
+        </p:nvSpPr>
+        <p:spPr>
+          <a:xfrm>
+            <a:off x="661736" y="3763512"/>
+            <a:ext cx="10253311" cy="2585323"/>
+          </a:xfrm>
+          <a:prstGeom prst="rect">
+            <a:avLst/>
+          </a:prstGeom>
+          <a:noFill/>
+        </p:spPr>
+        <p:txBody>
+          <a:bodyPr wrap="square">
+            <a:spAutoFit/>
+          </a:bodyPr>
+          <a:lstStyle/>
+          <a:p>
+            <a:pPr lvl="1"/>
+            <a:r>
+              <a:rPr lang="en-IN" dirty="0"/>
+              <a:t>EXPECTED: 	Evidence that your code compiles cleanly with no issues, warnings or </a:t>
+            </a:r>
+            <a:r>
+              <a:rPr lang="en-IN" dirty="0" err="1"/>
+              <a:t>Intellisense</a:t>
+            </a:r>
+            <a:r>
+              <a:rPr lang="en-IN" dirty="0"/>
+              <a:t> warning </a:t>
+            </a:r>
+          </a:p>
+          <a:p>
+            <a:pPr lvl="1"/>
+            <a:r>
+              <a:rPr lang="en-IN" dirty="0"/>
+              <a:t>                            Separation of functionality into Business logic Layer separate from Controller. </a:t>
+            </a:r>
+          </a:p>
+          <a:p>
+            <a:pPr lvl="1"/>
+            <a:r>
+              <a:rPr lang="en-IN" dirty="0"/>
+              <a:t>		your controller should never call DB directly – it should use Services</a:t>
+            </a:r>
+          </a:p>
+          <a:p>
+            <a:pPr lvl="1"/>
+            <a:r>
+              <a:rPr lang="en-IN" dirty="0"/>
+              <a:t>		Identify which services can be re-used and move to separate assembly, </a:t>
+            </a:r>
+          </a:p>
+          <a:p>
+            <a:pPr lvl="1"/>
+            <a:r>
+              <a:rPr lang="en-IN" dirty="0"/>
+              <a:t>		LOG ALL DATA/INFORMATION. </a:t>
+            </a:r>
+          </a:p>
+          <a:p>
+            <a:pPr lvl="1"/>
+            <a:endParaRPr lang="en-IN" dirty="0"/>
+          </a:p>
+          <a:p>
+            <a:pPr lvl="1"/>
+            <a:r>
+              <a:rPr lang="en-IN" dirty="0"/>
+              <a:t>		EXPLAIN YOUR FOLDER STRUCTURE, NAMESPACE AND HOW IT CAN BE NETTE</a:t>
+            </a:r>
+          </a:p>
+          <a:p>
+            <a:pPr lvl="1"/>
+            <a:endParaRPr lang="en-IN" dirty="0">
+              <a:sym typeface="Wingdings" panose="05000000000000000000" pitchFamily="2" charset="2"/>
+            </a:endParaRPr>
+          </a:p>
+        </p:txBody>
+      </p:sp>
+    </p:spTree>
+    <p:extLst>
+      <p:ext uri="{BB962C8B-B14F-4D97-AF65-F5344CB8AC3E}">
+        <p14:creationId xmlns:p14="http://schemas.microsoft.com/office/powerpoint/2010/main" val="2622476600"/>
+      </p:ext>
+    </p:extLst>
+  </p:cSld>
+  <p:clrMapOvr>
+    <a:masterClrMapping/>
+  </p:clrMapOvr>
+</p:sld>
+</file>
+
 <file path=ppt/slides/slide2.xml><?xml version="1.0" encoding="utf-8"?>
 <p:sld xmlns:a="http://schemas.openxmlformats.org/drawingml/2006/main" xmlns:r="http://schemas.openxmlformats.org/officeDocument/2006/relationships" xmlns:p="http://schemas.openxmlformats.org/presentationml/2006/main">
   <p:cSld>
@@ -3748,7 +6038,7 @@
         <p:spPr/>
         <p:txBody>
           <a:bodyPr>
-            <a:normAutofit/>
+            <a:normAutofit fontScale="77500" lnSpcReduction="20000"/>
           </a:bodyPr>
           <a:lstStyle/>
           <a:p>
@@ -3768,14 +6058,14 @@
             <a:pPr lvl="5"/>
             <a:r>
               <a:rPr lang="en-US" dirty="0"/>
-              <a:t>UPDATE 				LIMIT</a:t>
+              <a:t>UPDATE 				</a:t>
             </a:r>
           </a:p>
           <a:p>
             <a:pPr lvl="5"/>
             <a:r>
               <a:rPr lang="en-US" dirty="0"/>
-              <a:t>DELETE 				limit</a:t>
+              <a:t>DELETE 				LIMIT</a:t>
             </a:r>
           </a:p>
           <a:p>
@@ -3784,11 +6074,6 @@
               <a:rPr lang="en-US" dirty="0"/>
               <a:t>READ USER 				</a:t>
             </a:r>
-            <a:r>
-              <a:rPr lang="en-US" dirty="0" err="1"/>
-              <a:t>unlimiTED</a:t>
-            </a:r>
-            <a:endParaRPr lang="en-US" dirty="0"/>
           </a:p>
           <a:p>
             <a:r>
@@ -3821,13 +6106,25 @@
             <a:pPr lvl="5"/>
             <a:r>
               <a:rPr lang="en-US" dirty="0"/>
-              <a:t>READ USER 					limited </a:t>
+              <a:t>READ ACCT				LIMIT</a:t>
             </a:r>
           </a:p>
           <a:p>
             <a:r>
               <a:rPr lang="en-IN" dirty="0"/>
               <a:t>/LOGIN 		SET ALL ROLES </a:t>
+            </a:r>
+          </a:p>
+          <a:p>
+            <a:endParaRPr lang="en-IN" dirty="0"/>
+          </a:p>
+          <a:p>
+            <a:endParaRPr lang="en-IN" dirty="0"/>
+          </a:p>
+          <a:p>
+            <a:r>
+              <a:rPr lang="en-IN" sz="3600" b="1" dirty="0"/>
+              <a:t>ALL APIS MUST BE AUTHENTICATED, ONLY LIMIT NEEDS AUTHORIZATION</a:t>
             </a:r>
           </a:p>
         </p:txBody>
@@ -4136,6 +6433,1115 @@
   <p:clrMapOvr>
     <a:masterClrMapping/>
   </p:clrMapOvr>
+</p:sld>
+</file>
+
+<file path=ppt/slides/slide6.xml><?xml version="1.0" encoding="utf-8"?>
+<p:sld xmlns:a="http://schemas.openxmlformats.org/drawingml/2006/main" xmlns:r="http://schemas.openxmlformats.org/officeDocument/2006/relationships" xmlns:p="http://schemas.openxmlformats.org/presentationml/2006/main">
+  <p:cSld>
+    <p:spTree>
+      <p:nvGrpSpPr>
+        <p:cNvPr id="1" name=""/>
+        <p:cNvGrpSpPr/>
+        <p:nvPr/>
+      </p:nvGrpSpPr>
+      <p:grpSpPr>
+        <a:xfrm>
+          <a:off x="0" y="0"/>
+          <a:ext cx="0" cy="0"/>
+          <a:chOff x="0" y="0"/>
+          <a:chExt cx="0" cy="0"/>
+        </a:xfrm>
+      </p:grpSpPr>
+      <p:sp>
+        <p:nvSpPr>
+          <p:cNvPr id="2" name="Title 1">
+            <a:extLst>
+              <a:ext uri="{FF2B5EF4-FFF2-40B4-BE49-F238E27FC236}">
+                <a16:creationId xmlns:a16="http://schemas.microsoft.com/office/drawing/2014/main" id="{561AACE0-B340-45FD-32BD-AE8E6B5154DC}"/>
+              </a:ext>
+            </a:extLst>
+          </p:cNvPr>
+          <p:cNvSpPr>
+            <a:spLocks noGrp="1"/>
+          </p:cNvSpPr>
+          <p:nvPr>
+            <p:ph type="title"/>
+          </p:nvPr>
+        </p:nvSpPr>
+        <p:spPr/>
+        <p:txBody>
+          <a:bodyPr/>
+          <a:lstStyle/>
+          <a:p>
+            <a:r>
+              <a:rPr lang="en-US" dirty="0"/>
+              <a:t>Other notes	</a:t>
+            </a:r>
+            <a:endParaRPr lang="en-IN" dirty="0"/>
+          </a:p>
+        </p:txBody>
+      </p:sp>
+      <p:sp>
+        <p:nvSpPr>
+          <p:cNvPr id="3" name="Content Placeholder 2">
+            <a:extLst>
+              <a:ext uri="{FF2B5EF4-FFF2-40B4-BE49-F238E27FC236}">
+                <a16:creationId xmlns:a16="http://schemas.microsoft.com/office/drawing/2014/main" id="{B22E0109-F473-CADC-692D-0AACC6E60113}"/>
+              </a:ext>
+            </a:extLst>
+          </p:cNvPr>
+          <p:cNvSpPr>
+            <a:spLocks noGrp="1"/>
+          </p:cNvSpPr>
+          <p:nvPr>
+            <p:ph idx="1"/>
+          </p:nvPr>
+        </p:nvSpPr>
+        <p:spPr/>
+        <p:txBody>
+          <a:bodyPr/>
+          <a:lstStyle/>
+          <a:p>
+            <a:r>
+              <a:rPr lang="en-US" dirty="0"/>
+              <a:t>Create a new Database</a:t>
+            </a:r>
+          </a:p>
+          <a:p>
+            <a:endParaRPr lang="en-US" dirty="0"/>
+          </a:p>
+          <a:p>
+            <a:r>
+              <a:rPr lang="en-US" dirty="0"/>
+              <a:t>Keep Objects not in </a:t>
+            </a:r>
+            <a:r>
+              <a:rPr lang="en-US" dirty="0" err="1"/>
+              <a:t>dbo</a:t>
+            </a:r>
+            <a:r>
+              <a:rPr lang="en-US" dirty="0"/>
+              <a:t> schema</a:t>
+            </a:r>
+          </a:p>
+          <a:p>
+            <a:endParaRPr lang="en-US" dirty="0"/>
+          </a:p>
+          <a:p>
+            <a:r>
+              <a:rPr lang="en-US" dirty="0"/>
+              <a:t>Do not use Built in Windows Credentials – Create new SQL User/Login</a:t>
+            </a:r>
+          </a:p>
+          <a:p>
+            <a:endParaRPr lang="en-US" dirty="0"/>
+          </a:p>
+          <a:p>
+            <a:r>
+              <a:rPr lang="en-US" dirty="0"/>
+              <a:t>Do not keep Passwords in </a:t>
+            </a:r>
+            <a:r>
+              <a:rPr lang="en-US"/>
+              <a:t>Plain Text </a:t>
+            </a:r>
+            <a:r>
+              <a:rPr lang="en-US">
+                <a:sym typeface="Wingdings" panose="05000000000000000000" pitchFamily="2" charset="2"/>
+              </a:rPr>
+              <a:t> </a:t>
+            </a:r>
+            <a:endParaRPr lang="en-IN"/>
+          </a:p>
+        </p:txBody>
+      </p:sp>
+    </p:spTree>
+    <p:extLst>
+      <p:ext uri="{BB962C8B-B14F-4D97-AF65-F5344CB8AC3E}">
+        <p14:creationId xmlns:p14="http://schemas.microsoft.com/office/powerpoint/2010/main" val="1269175508"/>
+      </p:ext>
+    </p:extLst>
+  </p:cSld>
+  <p:clrMapOvr>
+    <a:masterClrMapping/>
+  </p:clrMapOvr>
+</p:sld>
+</file>
+
+<file path=ppt/slides/slide7.xml><?xml version="1.0" encoding="utf-8"?>
+<p:sld xmlns:a="http://schemas.openxmlformats.org/drawingml/2006/main" xmlns:r="http://schemas.openxmlformats.org/officeDocument/2006/relationships" xmlns:p="http://schemas.openxmlformats.org/presentationml/2006/main">
+  <p:cSld>
+    <p:spTree>
+      <p:nvGrpSpPr>
+        <p:cNvPr id="1" name="">
+          <a:extLst>
+            <a:ext uri="{FF2B5EF4-FFF2-40B4-BE49-F238E27FC236}">
+              <a16:creationId xmlns:a16="http://schemas.microsoft.com/office/drawing/2014/main" id="{35400A85-898E-664C-625C-A9C033628F33}"/>
+            </a:ext>
+          </a:extLst>
+        </p:cNvPr>
+        <p:cNvGrpSpPr/>
+        <p:nvPr/>
+      </p:nvGrpSpPr>
+      <p:grpSpPr>
+        <a:xfrm>
+          <a:off x="0" y="0"/>
+          <a:ext cx="0" cy="0"/>
+          <a:chOff x="0" y="0"/>
+          <a:chExt cx="0" cy="0"/>
+        </a:xfrm>
+      </p:grpSpPr>
+      <p:sp>
+        <p:nvSpPr>
+          <p:cNvPr id="4" name="Title 3">
+            <a:extLst>
+              <a:ext uri="{FF2B5EF4-FFF2-40B4-BE49-F238E27FC236}">
+                <a16:creationId xmlns:a16="http://schemas.microsoft.com/office/drawing/2014/main" id="{EA9AB3E1-7E3A-5CF1-0672-E58DB728511E}"/>
+              </a:ext>
+            </a:extLst>
+          </p:cNvPr>
+          <p:cNvSpPr>
+            <a:spLocks noGrp="1"/>
+          </p:cNvSpPr>
+          <p:nvPr>
+            <p:ph type="title"/>
+          </p:nvPr>
+        </p:nvSpPr>
+        <p:spPr/>
+        <p:txBody>
+          <a:bodyPr/>
+          <a:lstStyle/>
+          <a:p>
+            <a:r>
+              <a:rPr lang="en-US" dirty="0"/>
+              <a:t>Simple User and Account Management System</a:t>
+            </a:r>
+            <a:endParaRPr lang="en-IN" dirty="0"/>
+          </a:p>
+        </p:txBody>
+      </p:sp>
+      <p:sp>
+        <p:nvSpPr>
+          <p:cNvPr id="5" name="Content Placeholder 4">
+            <a:extLst>
+              <a:ext uri="{FF2B5EF4-FFF2-40B4-BE49-F238E27FC236}">
+                <a16:creationId xmlns:a16="http://schemas.microsoft.com/office/drawing/2014/main" id="{688F837F-739D-9A81-D893-C7E063137280}"/>
+              </a:ext>
+            </a:extLst>
+          </p:cNvPr>
+          <p:cNvSpPr>
+            <a:spLocks noGrp="1"/>
+          </p:cNvSpPr>
+          <p:nvPr>
+            <p:ph idx="1"/>
+          </p:nvPr>
+        </p:nvSpPr>
+        <p:spPr/>
+        <p:txBody>
+          <a:bodyPr>
+            <a:normAutofit fontScale="85000" lnSpcReduction="20000"/>
+          </a:bodyPr>
+          <a:lstStyle/>
+          <a:p>
+            <a:r>
+              <a:rPr lang="en-US" dirty="0"/>
+              <a:t>Users – </a:t>
+            </a:r>
+          </a:p>
+          <a:p>
+            <a:pPr lvl="1"/>
+            <a:r>
+              <a:rPr lang="en-US" dirty="0"/>
+              <a:t>Normal users</a:t>
+            </a:r>
+          </a:p>
+          <a:p>
+            <a:pPr lvl="1"/>
+            <a:r>
+              <a:rPr lang="en-US" dirty="0"/>
+              <a:t>Bank users</a:t>
+            </a:r>
+          </a:p>
+          <a:p>
+            <a:r>
+              <a:rPr lang="en-US" dirty="0"/>
+              <a:t>User can have multiple accounts in multiple banks </a:t>
+            </a:r>
+          </a:p>
+          <a:p>
+            <a:r>
+              <a:rPr lang="en-US" dirty="0"/>
+              <a:t>Each bank can have multiple branches</a:t>
+            </a:r>
+          </a:p>
+          <a:p>
+            <a:r>
+              <a:rPr lang="en-US" dirty="0"/>
+              <a:t>Accounts can be Saving or Current</a:t>
+            </a:r>
+          </a:p>
+          <a:p>
+            <a:r>
+              <a:rPr lang="en-US" dirty="0"/>
+              <a:t>Accounts can be operated by minors and/or POA </a:t>
+            </a:r>
+          </a:p>
+          <a:p>
+            <a:r>
+              <a:rPr lang="en-US" dirty="0"/>
+              <a:t>Term Deposits are ???? Accounts</a:t>
+            </a:r>
+          </a:p>
+          <a:p>
+            <a:r>
+              <a:rPr lang="en-US" dirty="0"/>
+              <a:t>Accounts can be run in multiple currencies (NRI accounts)  </a:t>
+            </a:r>
+          </a:p>
+          <a:p>
+            <a:r>
+              <a:rPr lang="en-US" dirty="0"/>
+              <a:t>Users can Deposit money, withdraw money (limited), close account (limited),  Operate an account (limited) , check balance (limited) </a:t>
+            </a:r>
+          </a:p>
+          <a:p>
+            <a:r>
+              <a:rPr lang="en-US" dirty="0"/>
+              <a:t>Each user has a set of roles and permissions</a:t>
+            </a:r>
+          </a:p>
+          <a:p>
+            <a:endParaRPr lang="en-IN" dirty="0"/>
+          </a:p>
+        </p:txBody>
+      </p:sp>
+    </p:spTree>
+    <p:extLst>
+      <p:ext uri="{BB962C8B-B14F-4D97-AF65-F5344CB8AC3E}">
+        <p14:creationId xmlns:p14="http://schemas.microsoft.com/office/powerpoint/2010/main" val="3491890841"/>
+      </p:ext>
+    </p:extLst>
+  </p:cSld>
+  <p:clrMapOvr>
+    <a:masterClrMapping/>
+  </p:clrMapOvr>
+</p:sld>
+</file>
+
+<file path=ppt/slides/slide8.xml><?xml version="1.0" encoding="utf-8"?>
+<p:sld xmlns:a="http://schemas.openxmlformats.org/drawingml/2006/main" xmlns:r="http://schemas.openxmlformats.org/officeDocument/2006/relationships" xmlns:p="http://schemas.openxmlformats.org/presentationml/2006/main">
+  <p:cSld>
+    <p:spTree>
+      <p:nvGrpSpPr>
+        <p:cNvPr id="1" name=""/>
+        <p:cNvGrpSpPr/>
+        <p:nvPr/>
+      </p:nvGrpSpPr>
+      <p:grpSpPr>
+        <a:xfrm>
+          <a:off x="0" y="0"/>
+          <a:ext cx="0" cy="0"/>
+          <a:chOff x="0" y="0"/>
+          <a:chExt cx="0" cy="0"/>
+        </a:xfrm>
+      </p:grpSpPr>
+      <p:sp>
+        <p:nvSpPr>
+          <p:cNvPr id="4" name="Rectangle 3">
+            <a:extLst>
+              <a:ext uri="{FF2B5EF4-FFF2-40B4-BE49-F238E27FC236}">
+                <a16:creationId xmlns:a16="http://schemas.microsoft.com/office/drawing/2014/main" id="{9E5181D7-1567-2053-AF8F-713D7065405E}"/>
+              </a:ext>
+            </a:extLst>
+          </p:cNvPr>
+          <p:cNvSpPr/>
+          <p:nvPr/>
+        </p:nvSpPr>
+        <p:spPr>
+          <a:xfrm>
+            <a:off x="1682817" y="935789"/>
+            <a:ext cx="8826366" cy="3330342"/>
+          </a:xfrm>
+          <a:prstGeom prst="rect">
+            <a:avLst/>
+          </a:prstGeom>
+        </p:spPr>
+        <p:style>
+          <a:lnRef idx="2">
+            <a:schemeClr val="accent1">
+              <a:shade val="15000"/>
+            </a:schemeClr>
+          </a:lnRef>
+          <a:fillRef idx="1">
+            <a:schemeClr val="accent1"/>
+          </a:fillRef>
+          <a:effectRef idx="0">
+            <a:schemeClr val="accent1"/>
+          </a:effectRef>
+          <a:fontRef idx="minor">
+            <a:schemeClr val="lt1"/>
+          </a:fontRef>
+        </p:style>
+        <p:txBody>
+          <a:bodyPr rtlCol="0" anchor="ctr"/>
+          <a:lstStyle/>
+          <a:p>
+            <a:pPr algn="ctr"/>
+            <a:endParaRPr lang="en-IN"/>
+          </a:p>
+        </p:txBody>
+      </p:sp>
+      <p:sp>
+        <p:nvSpPr>
+          <p:cNvPr id="5" name="TextBox 4">
+            <a:extLst>
+              <a:ext uri="{FF2B5EF4-FFF2-40B4-BE49-F238E27FC236}">
+                <a16:creationId xmlns:a16="http://schemas.microsoft.com/office/drawing/2014/main" id="{FDD89A77-8A1F-F164-34B0-FEE4BC5FB5B1}"/>
+              </a:ext>
+            </a:extLst>
+          </p:cNvPr>
+          <p:cNvSpPr txBox="1"/>
+          <p:nvPr/>
+        </p:nvSpPr>
+        <p:spPr>
+          <a:xfrm>
+            <a:off x="2069432" y="1386038"/>
+            <a:ext cx="8017844" cy="2129322"/>
+          </a:xfrm>
+          <a:prstGeom prst="rect">
+            <a:avLst/>
+          </a:prstGeom>
+          <a:noFill/>
+        </p:spPr>
+        <p:style>
+          <a:lnRef idx="2">
+            <a:schemeClr val="dk1"/>
+          </a:lnRef>
+          <a:fillRef idx="1">
+            <a:schemeClr val="lt1"/>
+          </a:fillRef>
+          <a:effectRef idx="0">
+            <a:schemeClr val="dk1"/>
+          </a:effectRef>
+          <a:fontRef idx="minor">
+            <a:schemeClr val="dk1"/>
+          </a:fontRef>
+        </p:style>
+        <p:txBody>
+          <a:bodyPr wrap="square" rtlCol="0" anchor="ctr" anchorCtr="0">
+            <a:noAutofit/>
+          </a:bodyPr>
+          <a:lstStyle/>
+          <a:p>
+            <a:pPr algn="ctr"/>
+            <a:r>
+              <a:rPr lang="en-US" sz="4800" b="1" dirty="0"/>
+              <a:t>PROBLEM STATEMENT</a:t>
+            </a:r>
+          </a:p>
+          <a:p>
+            <a:pPr algn="ctr"/>
+            <a:r>
+              <a:rPr lang="en-US" sz="4800" b="1" dirty="0"/>
+              <a:t>Bank Customers + Bank Employees</a:t>
+            </a:r>
+            <a:endParaRPr lang="en-IN" sz="4800" b="1" dirty="0"/>
+          </a:p>
+        </p:txBody>
+      </p:sp>
+      <p:sp>
+        <p:nvSpPr>
+          <p:cNvPr id="6" name="TextBox 5">
+            <a:extLst>
+              <a:ext uri="{FF2B5EF4-FFF2-40B4-BE49-F238E27FC236}">
+                <a16:creationId xmlns:a16="http://schemas.microsoft.com/office/drawing/2014/main" id="{99DC7E57-8506-C8E6-9195-5C6A9CBDBDFB}"/>
+              </a:ext>
+            </a:extLst>
+          </p:cNvPr>
+          <p:cNvSpPr txBox="1"/>
+          <p:nvPr/>
+        </p:nvSpPr>
+        <p:spPr>
+          <a:xfrm>
+            <a:off x="1682817" y="4592320"/>
+            <a:ext cx="8934383" cy="1815882"/>
+          </a:xfrm>
+          <a:prstGeom prst="rect">
+            <a:avLst/>
+          </a:prstGeom>
+          <a:noFill/>
+        </p:spPr>
+        <p:txBody>
+          <a:bodyPr wrap="square" rtlCol="0">
+            <a:spAutoFit/>
+          </a:bodyPr>
+          <a:lstStyle/>
+          <a:p>
+            <a:r>
+              <a:rPr lang="en-US" sz="2800" dirty="0"/>
+              <a:t> - Entity Design </a:t>
+            </a:r>
+          </a:p>
+          <a:p>
+            <a:r>
+              <a:rPr lang="en-US" sz="2800" dirty="0"/>
+              <a:t> -  Security </a:t>
+            </a:r>
+          </a:p>
+          <a:p>
+            <a:r>
+              <a:rPr lang="en-US" sz="2800" dirty="0"/>
+              <a:t>        - Authentication </a:t>
+            </a:r>
+          </a:p>
+          <a:p>
+            <a:r>
+              <a:rPr lang="en-US" sz="2800" dirty="0"/>
+              <a:t>        - Authorization </a:t>
+            </a:r>
+            <a:endParaRPr lang="en-IN" sz="2800" dirty="0"/>
+          </a:p>
+        </p:txBody>
+      </p:sp>
+    </p:spTree>
+    <p:extLst>
+      <p:ext uri="{BB962C8B-B14F-4D97-AF65-F5344CB8AC3E}">
+        <p14:creationId xmlns:p14="http://schemas.microsoft.com/office/powerpoint/2010/main" val="3850159292"/>
+      </p:ext>
+    </p:extLst>
+  </p:cSld>
+  <p:clrMapOvr>
+    <a:masterClrMapping/>
+  </p:clrMapOvr>
+</p:sld>
+</file>
+
+<file path=ppt/slides/slide9.xml><?xml version="1.0" encoding="utf-8"?>
+<p:sld xmlns:a="http://schemas.openxmlformats.org/drawingml/2006/main" xmlns:r="http://schemas.openxmlformats.org/officeDocument/2006/relationships" xmlns:p="http://schemas.openxmlformats.org/presentationml/2006/main">
+  <p:cSld>
+    <p:spTree>
+      <p:nvGrpSpPr>
+        <p:cNvPr id="1" name="">
+          <a:extLst>
+            <a:ext uri="{FF2B5EF4-FFF2-40B4-BE49-F238E27FC236}">
+              <a16:creationId xmlns:a16="http://schemas.microsoft.com/office/drawing/2014/main" id="{00BDD0A9-E8A1-48C3-F1DC-D727E10D4F93}"/>
+            </a:ext>
+          </a:extLst>
+        </p:cNvPr>
+        <p:cNvGrpSpPr/>
+        <p:nvPr/>
+      </p:nvGrpSpPr>
+      <p:grpSpPr>
+        <a:xfrm>
+          <a:off x="0" y="0"/>
+          <a:ext cx="0" cy="0"/>
+          <a:chOff x="0" y="0"/>
+          <a:chExt cx="0" cy="0"/>
+        </a:xfrm>
+      </p:grpSpPr>
+      <p:sp>
+        <p:nvSpPr>
+          <p:cNvPr id="4" name="Rectangle 3">
+            <a:extLst>
+              <a:ext uri="{FF2B5EF4-FFF2-40B4-BE49-F238E27FC236}">
+                <a16:creationId xmlns:a16="http://schemas.microsoft.com/office/drawing/2014/main" id="{315943E0-155B-C5D2-3425-9622D5E05C31}"/>
+              </a:ext>
+            </a:extLst>
+          </p:cNvPr>
+          <p:cNvSpPr/>
+          <p:nvPr/>
+        </p:nvSpPr>
+        <p:spPr>
+          <a:xfrm>
+            <a:off x="1682817" y="945949"/>
+            <a:ext cx="4291263" cy="3330342"/>
+          </a:xfrm>
+          <a:prstGeom prst="rect">
+            <a:avLst/>
+          </a:prstGeom>
+        </p:spPr>
+        <p:style>
+          <a:lnRef idx="2">
+            <a:schemeClr val="accent1">
+              <a:shade val="15000"/>
+            </a:schemeClr>
+          </a:lnRef>
+          <a:fillRef idx="1">
+            <a:schemeClr val="accent1"/>
+          </a:fillRef>
+          <a:effectRef idx="0">
+            <a:schemeClr val="accent1"/>
+          </a:effectRef>
+          <a:fontRef idx="minor">
+            <a:schemeClr val="lt1"/>
+          </a:fontRef>
+        </p:style>
+        <p:txBody>
+          <a:bodyPr rtlCol="0" anchor="ctr"/>
+          <a:lstStyle/>
+          <a:p>
+            <a:pPr algn="ctr"/>
+            <a:endParaRPr lang="en-IN"/>
+          </a:p>
+        </p:txBody>
+      </p:sp>
+      <p:sp>
+        <p:nvSpPr>
+          <p:cNvPr id="5" name="TextBox 4">
+            <a:extLst>
+              <a:ext uri="{FF2B5EF4-FFF2-40B4-BE49-F238E27FC236}">
+                <a16:creationId xmlns:a16="http://schemas.microsoft.com/office/drawing/2014/main" id="{0891A283-5834-234D-E017-65CDBDADA323}"/>
+              </a:ext>
+            </a:extLst>
+          </p:cNvPr>
+          <p:cNvSpPr txBox="1"/>
+          <p:nvPr/>
+        </p:nvSpPr>
+        <p:spPr>
+          <a:xfrm>
+            <a:off x="2130392" y="1386038"/>
+            <a:ext cx="3335688" cy="2129322"/>
+          </a:xfrm>
+          <a:prstGeom prst="rect">
+            <a:avLst/>
+          </a:prstGeom>
+          <a:noFill/>
+        </p:spPr>
+        <p:style>
+          <a:lnRef idx="2">
+            <a:schemeClr val="dk1"/>
+          </a:lnRef>
+          <a:fillRef idx="1">
+            <a:schemeClr val="lt1"/>
+          </a:fillRef>
+          <a:effectRef idx="0">
+            <a:schemeClr val="dk1"/>
+          </a:effectRef>
+          <a:fontRef idx="minor">
+            <a:schemeClr val="dk1"/>
+          </a:fontRef>
+        </p:style>
+        <p:txBody>
+          <a:bodyPr wrap="square" rtlCol="0" anchor="ctr" anchorCtr="0">
+            <a:noAutofit/>
+          </a:bodyPr>
+          <a:lstStyle/>
+          <a:p>
+            <a:pPr algn="ctr"/>
+            <a:r>
+              <a:rPr lang="en-US" sz="4800" b="1" dirty="0"/>
+              <a:t>Bank Customers</a:t>
+            </a:r>
+            <a:endParaRPr lang="en-IN" sz="4800" b="1" dirty="0"/>
+          </a:p>
+        </p:txBody>
+      </p:sp>
+      <p:sp>
+        <p:nvSpPr>
+          <p:cNvPr id="6" name="TextBox 5">
+            <a:extLst>
+              <a:ext uri="{FF2B5EF4-FFF2-40B4-BE49-F238E27FC236}">
+                <a16:creationId xmlns:a16="http://schemas.microsoft.com/office/drawing/2014/main" id="{BD0AC705-A650-6291-BCB0-453D67938585}"/>
+              </a:ext>
+            </a:extLst>
+          </p:cNvPr>
+          <p:cNvSpPr txBox="1"/>
+          <p:nvPr/>
+        </p:nvSpPr>
+        <p:spPr>
+          <a:xfrm>
+            <a:off x="1682817" y="4592320"/>
+            <a:ext cx="3905183" cy="1815882"/>
+          </a:xfrm>
+          <a:prstGeom prst="rect">
+            <a:avLst/>
+          </a:prstGeom>
+          <a:noFill/>
+        </p:spPr>
+        <p:txBody>
+          <a:bodyPr wrap="square" rtlCol="0">
+            <a:spAutoFit/>
+          </a:bodyPr>
+          <a:lstStyle/>
+          <a:p>
+            <a:r>
+              <a:rPr lang="en-US" sz="2800" dirty="0"/>
+              <a:t> - Entity Design </a:t>
+            </a:r>
+          </a:p>
+          <a:p>
+            <a:r>
+              <a:rPr lang="en-US" sz="2800" dirty="0"/>
+              <a:t> -  Security </a:t>
+            </a:r>
+          </a:p>
+          <a:p>
+            <a:r>
+              <a:rPr lang="en-US" sz="2800" dirty="0"/>
+              <a:t>        - Authentication </a:t>
+            </a:r>
+          </a:p>
+          <a:p>
+            <a:r>
+              <a:rPr lang="en-US" sz="2800" dirty="0"/>
+              <a:t>        - Authorization </a:t>
+            </a:r>
+            <a:endParaRPr lang="en-IN" sz="2800" dirty="0"/>
+          </a:p>
+        </p:txBody>
+      </p:sp>
+      <p:sp>
+        <p:nvSpPr>
+          <p:cNvPr id="2" name="Rectangle 1">
+            <a:extLst>
+              <a:ext uri="{FF2B5EF4-FFF2-40B4-BE49-F238E27FC236}">
+                <a16:creationId xmlns:a16="http://schemas.microsoft.com/office/drawing/2014/main" id="{44657D50-6A08-47AF-DD6C-39A6974F55A7}"/>
+              </a:ext>
+            </a:extLst>
+          </p:cNvPr>
+          <p:cNvSpPr/>
+          <p:nvPr/>
+        </p:nvSpPr>
+        <p:spPr>
+          <a:xfrm>
+            <a:off x="6725922" y="945949"/>
+            <a:ext cx="4291263" cy="3330342"/>
+          </a:xfrm>
+          <a:prstGeom prst="rect">
+            <a:avLst/>
+          </a:prstGeom>
+        </p:spPr>
+        <p:style>
+          <a:lnRef idx="2">
+            <a:schemeClr val="accent1">
+              <a:shade val="15000"/>
+            </a:schemeClr>
+          </a:lnRef>
+          <a:fillRef idx="1">
+            <a:schemeClr val="accent1"/>
+          </a:fillRef>
+          <a:effectRef idx="0">
+            <a:schemeClr val="accent1"/>
+          </a:effectRef>
+          <a:fontRef idx="minor">
+            <a:schemeClr val="lt1"/>
+          </a:fontRef>
+        </p:style>
+        <p:txBody>
+          <a:bodyPr rtlCol="0" anchor="ctr"/>
+          <a:lstStyle/>
+          <a:p>
+            <a:pPr algn="ctr"/>
+            <a:endParaRPr lang="en-IN"/>
+          </a:p>
+        </p:txBody>
+      </p:sp>
+      <p:sp>
+        <p:nvSpPr>
+          <p:cNvPr id="3" name="TextBox 2">
+            <a:extLst>
+              <a:ext uri="{FF2B5EF4-FFF2-40B4-BE49-F238E27FC236}">
+                <a16:creationId xmlns:a16="http://schemas.microsoft.com/office/drawing/2014/main" id="{5683BACB-2661-A0EA-2582-1DFA54F8267E}"/>
+              </a:ext>
+            </a:extLst>
+          </p:cNvPr>
+          <p:cNvSpPr txBox="1"/>
+          <p:nvPr/>
+        </p:nvSpPr>
+        <p:spPr>
+          <a:xfrm>
+            <a:off x="7173497" y="1386038"/>
+            <a:ext cx="3335688" cy="2129322"/>
+          </a:xfrm>
+          <a:prstGeom prst="rect">
+            <a:avLst/>
+          </a:prstGeom>
+          <a:noFill/>
+        </p:spPr>
+        <p:style>
+          <a:lnRef idx="2">
+            <a:schemeClr val="dk1"/>
+          </a:lnRef>
+          <a:fillRef idx="1">
+            <a:schemeClr val="lt1"/>
+          </a:fillRef>
+          <a:effectRef idx="0">
+            <a:schemeClr val="dk1"/>
+          </a:effectRef>
+          <a:fontRef idx="minor">
+            <a:schemeClr val="dk1"/>
+          </a:fontRef>
+        </p:style>
+        <p:txBody>
+          <a:bodyPr wrap="square" rtlCol="0" anchor="ctr" anchorCtr="0">
+            <a:noAutofit/>
+          </a:bodyPr>
+          <a:lstStyle/>
+          <a:p>
+            <a:pPr algn="ctr"/>
+            <a:r>
+              <a:rPr lang="en-US" sz="4800" b="1" dirty="0"/>
+              <a:t>Bank Employees</a:t>
+            </a:r>
+            <a:endParaRPr lang="en-IN" sz="4800" b="1" dirty="0"/>
+          </a:p>
+        </p:txBody>
+      </p:sp>
+      <p:sp>
+        <p:nvSpPr>
+          <p:cNvPr id="7" name="TextBox 6">
+            <a:extLst>
+              <a:ext uri="{FF2B5EF4-FFF2-40B4-BE49-F238E27FC236}">
+                <a16:creationId xmlns:a16="http://schemas.microsoft.com/office/drawing/2014/main" id="{B0A170FF-9D79-A02E-5F50-BD655F9FF286}"/>
+              </a:ext>
+            </a:extLst>
+          </p:cNvPr>
+          <p:cNvSpPr txBox="1"/>
+          <p:nvPr/>
+        </p:nvSpPr>
+        <p:spPr>
+          <a:xfrm>
+            <a:off x="7173497" y="4592320"/>
+            <a:ext cx="3905183" cy="1815882"/>
+          </a:xfrm>
+          <a:prstGeom prst="rect">
+            <a:avLst/>
+          </a:prstGeom>
+          <a:noFill/>
+        </p:spPr>
+        <p:txBody>
+          <a:bodyPr wrap="square" rtlCol="0">
+            <a:spAutoFit/>
+          </a:bodyPr>
+          <a:lstStyle/>
+          <a:p>
+            <a:r>
+              <a:rPr lang="en-US" sz="2800" dirty="0"/>
+              <a:t> - Entity Design </a:t>
+            </a:r>
+          </a:p>
+          <a:p>
+            <a:r>
+              <a:rPr lang="en-US" sz="2800" dirty="0"/>
+              <a:t> -  Security </a:t>
+            </a:r>
+          </a:p>
+          <a:p>
+            <a:r>
+              <a:rPr lang="en-US" sz="2800" dirty="0"/>
+              <a:t>        - Authentication </a:t>
+            </a:r>
+          </a:p>
+          <a:p>
+            <a:r>
+              <a:rPr lang="en-US" sz="2800" dirty="0"/>
+              <a:t>        - Authorization </a:t>
+            </a:r>
+            <a:endParaRPr lang="en-IN" sz="2800" dirty="0"/>
+          </a:p>
+        </p:txBody>
+      </p:sp>
+      <p:sp>
+        <p:nvSpPr>
+          <p:cNvPr id="8" name="TextBox 7">
+            <a:extLst>
+              <a:ext uri="{FF2B5EF4-FFF2-40B4-BE49-F238E27FC236}">
+                <a16:creationId xmlns:a16="http://schemas.microsoft.com/office/drawing/2014/main" id="{72D5631A-54E2-686B-5B5E-085C80FA8DBA}"/>
+              </a:ext>
+            </a:extLst>
+          </p:cNvPr>
+          <p:cNvSpPr txBox="1"/>
+          <p:nvPr/>
+        </p:nvSpPr>
+        <p:spPr>
+          <a:xfrm>
+            <a:off x="1682817" y="294640"/>
+            <a:ext cx="9395863" cy="523220"/>
+          </a:xfrm>
+          <a:prstGeom prst="rect">
+            <a:avLst/>
+          </a:prstGeom>
+          <a:solidFill>
+            <a:srgbClr val="002060"/>
+          </a:solidFill>
+        </p:spPr>
+        <p:style>
+          <a:lnRef idx="2">
+            <a:schemeClr val="dk1"/>
+          </a:lnRef>
+          <a:fillRef idx="1">
+            <a:schemeClr val="lt1"/>
+          </a:fillRef>
+          <a:effectRef idx="0">
+            <a:schemeClr val="dk1"/>
+          </a:effectRef>
+          <a:fontRef idx="minor">
+            <a:schemeClr val="dk1"/>
+          </a:fontRef>
+        </p:style>
+        <p:txBody>
+          <a:bodyPr wrap="square" rtlCol="0">
+            <a:spAutoFit/>
+          </a:bodyPr>
+          <a:lstStyle/>
+          <a:p>
+            <a:pPr algn="ctr"/>
+            <a:r>
+              <a:rPr lang="en-US" sz="2800" dirty="0">
+                <a:solidFill>
+                  <a:schemeClr val="bg1"/>
+                </a:solidFill>
+              </a:rPr>
+              <a:t>BREAKING UP THE PROBLEM</a:t>
+            </a:r>
+            <a:endParaRPr lang="en-IN" sz="2800" dirty="0">
+              <a:solidFill>
+                <a:schemeClr val="bg1"/>
+              </a:solidFill>
+            </a:endParaRPr>
+          </a:p>
+        </p:txBody>
+      </p:sp>
+      <p:sp>
+        <p:nvSpPr>
+          <p:cNvPr id="9" name="Rectangle 8">
+            <a:extLst>
+              <a:ext uri="{FF2B5EF4-FFF2-40B4-BE49-F238E27FC236}">
+                <a16:creationId xmlns:a16="http://schemas.microsoft.com/office/drawing/2014/main" id="{5B0F3946-86C8-F475-A9BB-8EE2BCA92D9D}"/>
+              </a:ext>
+            </a:extLst>
+          </p:cNvPr>
+          <p:cNvSpPr/>
+          <p:nvPr/>
+        </p:nvSpPr>
+        <p:spPr>
+          <a:xfrm>
+            <a:off x="3167955" y="2201123"/>
+            <a:ext cx="5856090" cy="1754326"/>
+          </a:xfrm>
+          <a:prstGeom prst="rect">
+            <a:avLst/>
+          </a:prstGeom>
+          <a:noFill/>
+        </p:spPr>
+        <p:txBody>
+          <a:bodyPr wrap="none" lIns="91440" tIns="45720" rIns="91440" bIns="45720">
+            <a:spAutoFit/>
+          </a:bodyPr>
+          <a:lstStyle/>
+          <a:p>
+            <a:pPr algn="ctr"/>
+            <a:r>
+              <a:rPr lang="en-US" sz="5400" b="1" cap="none" spc="0" dirty="0">
+                <a:ln w="12700" cmpd="sng">
+                  <a:solidFill>
+                    <a:schemeClr val="accent4"/>
+                  </a:solidFill>
+                  <a:prstDash val="solid"/>
+                </a:ln>
+                <a:solidFill>
+                  <a:srgbClr val="FF0000"/>
+                </a:solidFill>
+                <a:effectLst/>
+              </a:rPr>
+              <a:t>Divide and Conquer</a:t>
+            </a:r>
+          </a:p>
+          <a:p>
+            <a:pPr algn="ctr"/>
+            <a:r>
+              <a:rPr lang="en-US" sz="5400" b="1" dirty="0">
+                <a:ln w="12700" cmpd="sng">
+                  <a:solidFill>
+                    <a:schemeClr val="accent4"/>
+                  </a:solidFill>
+                  <a:prstDash val="solid"/>
+                </a:ln>
+                <a:solidFill>
+                  <a:srgbClr val="FF0000"/>
+                </a:solidFill>
+              </a:rPr>
+              <a:t>Backlogs</a:t>
+            </a:r>
+            <a:endParaRPr lang="en-US" sz="5400" b="1" cap="none" spc="0" dirty="0">
+              <a:ln w="12700" cmpd="sng">
+                <a:solidFill>
+                  <a:schemeClr val="accent4"/>
+                </a:solidFill>
+                <a:prstDash val="solid"/>
+              </a:ln>
+              <a:solidFill>
+                <a:srgbClr val="FF0000"/>
+              </a:solidFill>
+              <a:effectLst/>
+            </a:endParaRPr>
+          </a:p>
+        </p:txBody>
+      </p:sp>
+    </p:spTree>
+    <p:extLst>
+      <p:ext uri="{BB962C8B-B14F-4D97-AF65-F5344CB8AC3E}">
+        <p14:creationId xmlns:p14="http://schemas.microsoft.com/office/powerpoint/2010/main" val="3790894161"/>
+      </p:ext>
+    </p:extLst>
+  </p:cSld>
+  <p:clrMapOvr>
+    <a:masterClrMapping/>
+  </p:clrMapOvr>
+  <p:timing>
+    <p:tnLst>
+      <p:par>
+        <p:cTn id="1" dur="indefinite" restart="never" nodeType="tmRoot">
+          <p:childTnLst>
+            <p:seq concurrent="1" nextAc="seek">
+              <p:cTn id="2" dur="indefinite" nodeType="mainSeq">
+                <p:childTnLst>
+                  <p:par>
+                    <p:cTn id="3" fill="hold">
+                      <p:stCondLst>
+                        <p:cond delay="indefinite"/>
+                      </p:stCondLst>
+                      <p:childTnLst>
+                        <p:par>
+                          <p:cTn id="4" fill="hold">
+                            <p:stCondLst>
+                              <p:cond delay="0"/>
+                            </p:stCondLst>
+                            <p:childTnLst>
+                              <p:par>
+                                <p:cTn id="5" presetID="2" presetClass="entr" presetSubtype="8" repeatCount="indefinite" fill="hold" grpId="0" nodeType="clickEffect">
+                                  <p:stCondLst>
+                                    <p:cond delay="0"/>
+                                  </p:stCondLst>
+                                  <p:endCondLst>
+                                    <p:cond evt="onNext" delay="0">
+                                      <p:tgtEl>
+                                        <p:sldTgt/>
+                                      </p:tgtEl>
+                                    </p:cond>
+                                  </p:endCondLst>
+                                  <p:childTnLst>
+                                    <p:set>
+                                      <p:cBhvr>
+                                        <p:cTn id="6" dur="1" fill="hold">
+                                          <p:stCondLst>
+                                            <p:cond delay="0"/>
+                                          </p:stCondLst>
+                                        </p:cTn>
+                                        <p:tgtEl>
+                                          <p:spTgt spid="9"/>
+                                        </p:tgtEl>
+                                        <p:attrNameLst>
+                                          <p:attrName>style.visibility</p:attrName>
+                                        </p:attrNameLst>
+                                      </p:cBhvr>
+                                      <p:to>
+                                        <p:strVal val="visible"/>
+                                      </p:to>
+                                    </p:set>
+                                    <p:anim calcmode="lin" valueType="num">
+                                      <p:cBhvr additive="base">
+                                        <p:cTn id="7" dur="3000" fill="hold"/>
+                                        <p:tgtEl>
+                                          <p:spTgt spid="9"/>
+                                        </p:tgtEl>
+                                        <p:attrNameLst>
+                                          <p:attrName>ppt_x</p:attrName>
+                                        </p:attrNameLst>
+                                      </p:cBhvr>
+                                      <p:tavLst>
+                                        <p:tav tm="0">
+                                          <p:val>
+                                            <p:strVal val="0-#ppt_w/2"/>
+                                          </p:val>
+                                        </p:tav>
+                                        <p:tav tm="100000">
+                                          <p:val>
+                                            <p:strVal val="#ppt_x"/>
+                                          </p:val>
+                                        </p:tav>
+                                      </p:tavLst>
+                                    </p:anim>
+                                    <p:anim calcmode="lin" valueType="num">
+                                      <p:cBhvr additive="base">
+                                        <p:cTn id="8" dur="3000" fill="hold"/>
+                                        <p:tgtEl>
+                                          <p:spTgt spid="9"/>
+                                        </p:tgtEl>
+                                        <p:attrNameLst>
+                                          <p:attrName>ppt_y</p:attrName>
+                                        </p:attrNameLst>
+                                      </p:cBhvr>
+                                      <p:tavLst>
+                                        <p:tav tm="0">
+                                          <p:val>
+                                            <p:strVal val="#ppt_y"/>
+                                          </p:val>
+                                        </p:tav>
+                                        <p:tav tm="100000">
+                                          <p:val>
+                                            <p:strVal val="#ppt_y"/>
+                                          </p:val>
+                                        </p:tav>
+                                      </p:tavLst>
+                                    </p:anim>
+                                  </p:childTnLst>
+                                  <p:subTnLst>
+                                    <p:set>
+                                      <p:cBhvr override="childStyle">
+                                        <p:cTn dur="1" fill="hold" display="0" masterRel="sameClick" afterEffect="1">
+                                          <p:stCondLst>
+                                            <p:cond evt="end" delay="0">
+                                              <p:tn val="5"/>
+                                            </p:cond>
+                                          </p:stCondLst>
+                                        </p:cTn>
+                                        <p:tgtEl>
+                                          <p:spTgt spid="9"/>
+                                        </p:tgtEl>
+                                        <p:attrNameLst>
+                                          <p:attrName>style.visibility</p:attrName>
+                                        </p:attrNameLst>
+                                      </p:cBhvr>
+                                      <p:to>
+                                        <p:strVal val="hidden"/>
+                                      </p:to>
+                                    </p:set>
+                                  </p:subTnLst>
+                                </p:cTn>
+                              </p:par>
+                            </p:childTnLst>
+                          </p:cTn>
+                        </p:par>
+                      </p:childTnLst>
+                    </p:cTn>
+                  </p:par>
+                </p:childTnLst>
+              </p:cTn>
+              <p:prevCondLst>
+                <p:cond evt="onPrev" delay="0">
+                  <p:tgtEl>
+                    <p:sldTgt/>
+                  </p:tgtEl>
+                </p:cond>
+              </p:prevCondLst>
+              <p:nextCondLst>
+                <p:cond evt="onNext" delay="0">
+                  <p:tgtEl>
+                    <p:sldTgt/>
+                  </p:tgtEl>
+                </p:cond>
+              </p:nextCondLst>
+            </p:seq>
+          </p:childTnLst>
+        </p:cTn>
+      </p:par>
+    </p:tnLst>
+    <p:bldLst>
+      <p:bldP spid="9" grpId="0"/>
+    </p:bldLst>
+  </p:timing>
 </p:sld>
 </file>
 

</xml_diff>